<commit_message>
slides adapted and errors corrected
</commit_message>
<xml_diff>
--- a/presentation/Presentation-Ehler-Mitterer-Rienau-Seeser-Urban.pptx
+++ b/presentation/Presentation-Ehler-Mitterer-Rienau-Seeser-Urban.pptx
@@ -162,7 +162,7 @@
   </p:defaultTextStyle>
   <p:extLst>
     <p:ext uri="{EFAFB233-063F-42B5-8137-9DF3F51BA10A}">
-      <p15:sldGuideLst xmlns="" xmlns:p15="http://schemas.microsoft.com/office/powerpoint/2012/main" xmlns:mv="urn:schemas-microsoft-com:mac:vml" xmlns:mc="http://schemas.openxmlformats.org/markup-compatibility/2006">
+      <p15:sldGuideLst xmlns:p15="http://schemas.microsoft.com/office/powerpoint/2012/main">
         <p15:guide id="1" orient="horz" pos="2160">
           <p15:clr>
             <a:srgbClr val="A4A3A4"/>
@@ -176,7 +176,18 @@
       </p15:sldGuideLst>
     </p:ext>
     <p:ext uri="{2D200454-40CA-4A62-9FC3-DE9A4176ACB9}">
-      <p15:notesGuideLst xmlns="" xmlns:p15="http://schemas.microsoft.com/office/powerpoint/2012/main" xmlns:mv="urn:schemas-microsoft-com:mac:vml" xmlns:mc="http://schemas.openxmlformats.org/markup-compatibility/2006"/>
+      <p15:notesGuideLst xmlns:p15="http://schemas.microsoft.com/office/powerpoint/2012/main">
+        <p15:guide id="1" orient="horz" pos="2100">
+          <p15:clr>
+            <a:srgbClr val="A4A3A4"/>
+          </p15:clr>
+        </p15:guide>
+        <p15:guide id="2" pos="3126">
+          <p15:clr>
+            <a:srgbClr val="A4A3A4"/>
+          </p15:clr>
+        </p15:guide>
+      </p15:notesGuideLst>
     </p:ext>
   </p:extLst>
 </p:presentation>
@@ -288,7 +299,7 @@
             </a:pPr>
             <a:fld id="{0999E4A7-FEC7-BC4E-94F0-4E39CB2D987E}" type="datetime1">
               <a:rPr lang="de-DE" smtClean="0"/>
-              <a:t>24.08.17</a:t>
+              <a:t>27.08.2017</a:t>
             </a:fld>
             <a:endParaRPr lang="en-GB" dirty="0"/>
           </a:p>
@@ -505,7 +516,7 @@
             </a:pPr>
             <a:fld id="{606D2FA8-812A-E143-A421-8366E0E47471}" type="datetime1">
               <a:rPr lang="de-DE" smtClean="0"/>
-              <a:t>24.08.17</a:t>
+              <a:t>27.08.2017</a:t>
             </a:fld>
             <a:endParaRPr lang="en-GB"/>
           </a:p>
@@ -541,7 +552,7 @@
           <a:lstStyle/>
           <a:p>
             <a:pPr lvl="0"/>
-            <a:endParaRPr lang="en-GB" noProof="0" smtClean="0"/>
+            <a:endParaRPr lang="en-GB" noProof="0"/>
           </a:p>
         </p:txBody>
       </p:sp>
@@ -575,38 +586,38 @@
           <a:p>
             <a:pPr lvl="0"/>
             <a:r>
-              <a:rPr lang="de-DE" dirty="0" smtClean="0"/>
+              <a:rPr lang="de-DE" dirty="0"/>
               <a:t>Textmasterformate durch Klicken bearbeiten</a:t>
             </a:r>
           </a:p>
           <a:p>
             <a:pPr lvl="1"/>
             <a:r>
-              <a:rPr lang="de-DE" dirty="0" smtClean="0"/>
+              <a:rPr lang="de-DE" dirty="0"/>
               <a:t>Zweite Ebene</a:t>
             </a:r>
           </a:p>
           <a:p>
             <a:pPr lvl="2"/>
             <a:r>
-              <a:rPr lang="de-DE" dirty="0" smtClean="0"/>
+              <a:rPr lang="de-DE" dirty="0"/>
               <a:t>Dritte Ebene</a:t>
             </a:r>
           </a:p>
           <a:p>
             <a:pPr lvl="3"/>
             <a:r>
-              <a:rPr lang="de-DE" dirty="0" smtClean="0"/>
+              <a:rPr lang="de-DE" dirty="0"/>
               <a:t>Vierte Ebene</a:t>
             </a:r>
           </a:p>
           <a:p>
             <a:pPr lvl="4"/>
             <a:r>
-              <a:rPr lang="de-DE" dirty="0" smtClean="0"/>
+              <a:rPr lang="de-DE" dirty="0"/>
               <a:t>Fünfte Ebene</a:t>
             </a:r>
-            <a:endParaRPr lang="en-GB" dirty="0" smtClean="0"/>
+            <a:endParaRPr lang="en-GB" dirty="0"/>
           </a:p>
         </p:txBody>
       </p:sp>
@@ -2165,14 +2176,14 @@
           <a:p>
             <a:pPr lvl="0"/>
             <a:r>
-              <a:rPr lang="de-DE" noProof="0" dirty="0" smtClean="0"/>
+              <a:rPr lang="de-DE" noProof="0" dirty="0"/>
               <a:t>Referent</a:t>
             </a:r>
             <a:br>
-              <a:rPr lang="de-DE" noProof="0" dirty="0" smtClean="0"/>
+              <a:rPr lang="de-DE" noProof="0" dirty="0"/>
             </a:br>
             <a:r>
-              <a:rPr lang="de-DE" noProof="0" dirty="0" smtClean="0"/>
+              <a:rPr lang="de-DE" noProof="0" dirty="0"/>
               <a:t>Ort, Datum (Schreibweise: 00. Januar 2015)</a:t>
             </a:r>
           </a:p>
@@ -2228,7 +2239,7 @@
               <a:buNone/>
               <a:tabLst/>
             </a:pPr>
-            <a:endParaRPr kumimoji="0" lang="de-DE" sz="2000" b="0" i="0" u="none" strike="noStrike" cap="none" normalizeH="0" baseline="0" smtClean="0">
+            <a:endParaRPr kumimoji="0" lang="de-DE" sz="2000" b="0" i="0" u="none" strike="noStrike" cap="none" normalizeH="0" baseline="0">
               <a:ln>
                 <a:noFill/>
               </a:ln>
@@ -2281,10 +2292,10 @@
           <a:lstStyle/>
           <a:p>
             <a:r>
-              <a:rPr lang="de-DE" smtClean="0"/>
+              <a:rPr lang="de-DE"/>
               <a:t>XML Technology | BlackJack | Urban, Seeser, Rienau, Mitterer, Ehler | Garching, 08/30/17</a:t>
             </a:r>
-            <a:endParaRPr lang="en-US" dirty="0" smtClean="0"/>
+            <a:endParaRPr lang="en-US" dirty="0"/>
           </a:p>
         </p:txBody>
       </p:sp>
@@ -2332,10 +2343,9 @@
           <a:p>
             <a:pPr lvl="0"/>
             <a:r>
-              <a:rPr lang="de-DE" noProof="0" dirty="0" smtClean="0"/>
+              <a:rPr lang="de-DE" noProof="0" dirty="0"/>
               <a:t>Titel durch Klicken bearbeiten</a:t>
             </a:r>
-            <a:endParaRPr lang="de-DE" noProof="0" dirty="0"/>
           </a:p>
         </p:txBody>
       </p:sp>
@@ -2349,13 +2359,6 @@
   <p:clrMapOvr>
     <a:masterClrMapping/>
   </p:clrMapOvr>
-  <p:timing>
-    <p:tnLst>
-      <p:par>
-        <p:cTn xmlns:p14="http://schemas.microsoft.com/office/powerpoint/2010/main" id="1" dur="indefinite" restart="never" nodeType="tmRoot"/>
-      </p:par>
-    </p:tnLst>
-  </p:timing>
 </p:sldLayout>
 </file>
 
@@ -2462,7 +2465,7 @@
           <a:p>
             <a:pPr lvl="0"/>
             <a:r>
-              <a:rPr lang="de-DE" noProof="0" dirty="0" smtClean="0"/>
+              <a:rPr lang="de-DE" noProof="0" dirty="0"/>
               <a:t>Inhalt durch Klicken bearbeiten</a:t>
             </a:r>
           </a:p>
@@ -2508,7 +2511,7 @@
           <a:lstStyle/>
           <a:p>
             <a:r>
-              <a:rPr lang="de-DE" noProof="0" smtClean="0"/>
+              <a:rPr lang="de-DE" noProof="0"/>
               <a:t>XML Technology | BlackJack | Urban, Seeser, Rienau, Mitterer, Ehler | Garching, 08/30/17</a:t>
             </a:r>
           </a:p>
@@ -2556,24 +2559,24 @@
           <a:p>
             <a:pPr lvl="0"/>
             <a:r>
-              <a:rPr lang="de-DE" dirty="0" smtClean="0"/>
+              <a:rPr lang="de-DE" dirty="0"/>
               <a:t>Textmasterformate durch Klicken bearbeiten</a:t>
             </a:r>
           </a:p>
           <a:p>
             <a:pPr lvl="1"/>
             <a:r>
-              <a:rPr lang="de-DE" dirty="0" smtClean="0"/>
+              <a:rPr lang="de-DE" dirty="0"/>
               <a:t>Zweite Ebene</a:t>
             </a:r>
           </a:p>
           <a:p>
             <a:pPr lvl="2"/>
             <a:r>
-              <a:rPr lang="de-DE" sz="1600" dirty="0" smtClean="0"/>
+              <a:rPr lang="de-DE" sz="1600" dirty="0"/>
               <a:t>Dritte Ebene</a:t>
             </a:r>
-            <a:endParaRPr lang="de-DE" dirty="0" smtClean="0"/>
+            <a:endParaRPr lang="de-DE" dirty="0"/>
           </a:p>
         </p:txBody>
       </p:sp>
@@ -2655,10 +2658,9 @@
           <a:p>
             <a:pPr lvl="0"/>
             <a:r>
-              <a:rPr lang="de-DE" noProof="0" dirty="0" smtClean="0"/>
+              <a:rPr lang="de-DE" noProof="0" dirty="0"/>
               <a:t>Titel durch Klicken bearbeiten</a:t>
             </a:r>
-            <a:endParaRPr lang="de-DE" noProof="0" dirty="0"/>
           </a:p>
         </p:txBody>
       </p:sp>
@@ -2672,13 +2674,6 @@
   <p:clrMapOvr>
     <a:masterClrMapping/>
   </p:clrMapOvr>
-  <p:timing>
-    <p:tnLst>
-      <p:par>
-        <p:cTn xmlns:p14="http://schemas.microsoft.com/office/powerpoint/2010/main" id="1" dur="indefinite" restart="never" nodeType="tmRoot"/>
-      </p:par>
-    </p:tnLst>
-  </p:timing>
 </p:sldLayout>
 </file>
 
@@ -2742,7 +2737,7 @@
           <a:p>
             <a:pPr lvl="0"/>
             <a:r>
-              <a:rPr lang="de-DE" noProof="0" smtClean="0"/>
+              <a:rPr lang="de-DE" noProof="0"/>
               <a:t>Inhalt durch Klicken bearbeiten</a:t>
             </a:r>
           </a:p>
@@ -2788,7 +2783,7 @@
           <a:lstStyle/>
           <a:p>
             <a:r>
-              <a:rPr lang="de-DE" noProof="0" smtClean="0"/>
+              <a:rPr lang="de-DE" noProof="0"/>
               <a:t>XML Technology | BlackJack | Urban, Seeser, Rienau, Mitterer, Ehler | Garching, 08/30/17</a:t>
             </a:r>
           </a:p>
@@ -2865,10 +2860,9 @@
           <a:p>
             <a:pPr lvl="0"/>
             <a:r>
-              <a:rPr lang="de-DE" noProof="0" dirty="0" smtClean="0"/>
+              <a:rPr lang="de-DE" noProof="0" dirty="0"/>
               <a:t>Titel durch Klicken bearbeiten</a:t>
             </a:r>
-            <a:endParaRPr lang="de-DE" noProof="0" dirty="0"/>
           </a:p>
         </p:txBody>
       </p:sp>
@@ -2882,13 +2876,6 @@
   <p:clrMapOvr>
     <a:masterClrMapping/>
   </p:clrMapOvr>
-  <p:timing>
-    <p:tnLst>
-      <p:par>
-        <p:cTn xmlns:p14="http://schemas.microsoft.com/office/powerpoint/2010/main" id="1" dur="indefinite" restart="never" nodeType="tmRoot"/>
-      </p:par>
-    </p:tnLst>
-  </p:timing>
 </p:sldLayout>
 </file>
 
@@ -2983,10 +2970,10 @@
           <a:lstStyle/>
           <a:p>
             <a:r>
-              <a:rPr lang="de-DE" smtClean="0"/>
+              <a:rPr lang="de-DE"/>
               <a:t>XML Technology | BlackJack | Urban, Seeser, Rienau, Mitterer, Ehler | Garching, 08/30/17</a:t>
             </a:r>
-            <a:endParaRPr lang="en-US" dirty="0" smtClean="0"/>
+            <a:endParaRPr lang="en-US" dirty="0"/>
           </a:p>
         </p:txBody>
       </p:sp>
@@ -3034,10 +3021,9 @@
           <a:p>
             <a:pPr lvl="0"/>
             <a:r>
-              <a:rPr lang="de-DE" noProof="0" dirty="0" smtClean="0"/>
+              <a:rPr lang="de-DE" noProof="0" dirty="0"/>
               <a:t>Titel durch Klicken bearbeiten</a:t>
             </a:r>
-            <a:endParaRPr lang="de-DE" noProof="0" dirty="0"/>
           </a:p>
         </p:txBody>
       </p:sp>
@@ -3051,13 +3037,6 @@
   <p:clrMapOvr>
     <a:masterClrMapping/>
   </p:clrMapOvr>
-  <p:timing>
-    <p:tnLst>
-      <p:par>
-        <p:cTn xmlns:p14="http://schemas.microsoft.com/office/powerpoint/2010/main" id="1" dur="indefinite" restart="never" nodeType="tmRoot"/>
-      </p:par>
-    </p:tnLst>
-  </p:timing>
 </p:sldLayout>
 </file>
 
@@ -3126,32 +3105,27 @@
           <a:p>
             <a:pPr lvl="0"/>
             <a:r>
-              <a:rPr lang="de-DE" noProof="0" dirty="0" smtClean="0"/>
+              <a:rPr lang="de-DE" noProof="0" dirty="0"/>
               <a:t>Präsentationsmuster</a:t>
             </a:r>
             <a:br>
-              <a:rPr lang="de-DE" noProof="0" dirty="0" smtClean="0"/>
+              <a:rPr lang="de-DE" noProof="0" dirty="0"/>
             </a:br>
-            <a:r>
-              <a:rPr lang="de-DE" noProof="0" dirty="0" smtClean="0"/>
-              <a:t/>
-            </a:r>
             <a:br>
-              <a:rPr lang="de-DE" noProof="0" dirty="0" smtClean="0"/>
+              <a:rPr lang="de-DE" noProof="0" dirty="0"/>
             </a:br>
             <a:r>
-              <a:rPr lang="de-DE" noProof="0" dirty="0" smtClean="0"/>
+              <a:rPr lang="de-DE" noProof="0" dirty="0"/>
               <a:t>kann auch als </a:t>
             </a:r>
             <a:r>
-              <a:rPr lang="de-DE" noProof="0" dirty="0" err="1" smtClean="0"/>
+              <a:rPr lang="de-DE" noProof="0" dirty="0" err="1"/>
               <a:t>Kapiteltrenner</a:t>
             </a:r>
             <a:r>
-              <a:rPr lang="de-DE" noProof="0" dirty="0" smtClean="0"/>
+              <a:rPr lang="de-DE" noProof="0" dirty="0"/>
               <a:t> verwendet werden</a:t>
             </a:r>
-            <a:endParaRPr lang="de-DE" noProof="0" dirty="0"/>
           </a:p>
         </p:txBody>
       </p:sp>
@@ -3195,10 +3169,10 @@
           <a:lstStyle/>
           <a:p>
             <a:r>
-              <a:rPr lang="de-DE" smtClean="0"/>
+              <a:rPr lang="de-DE"/>
               <a:t>XML Technology | BlackJack | Urban, Seeser, Rienau, Mitterer, Ehler | Garching, 08/30/17</a:t>
             </a:r>
-            <a:endParaRPr lang="en-US" dirty="0" smtClean="0"/>
+            <a:endParaRPr lang="en-US" dirty="0"/>
           </a:p>
         </p:txBody>
       </p:sp>
@@ -3212,13 +3186,6 @@
   <p:clrMapOvr>
     <a:masterClrMapping/>
   </p:clrMapOvr>
-  <p:timing>
-    <p:tnLst>
-      <p:par>
-        <p:cTn xmlns:p14="http://schemas.microsoft.com/office/powerpoint/2010/main" id="1" dur="indefinite" restart="never" nodeType="tmRoot"/>
-      </p:par>
-    </p:tnLst>
-  </p:timing>
 </p:sldLayout>
 </file>
 
@@ -3295,10 +3262,10 @@
           </a:lstStyle>
           <a:p>
             <a:r>
-              <a:rPr lang="de-DE" smtClean="0"/>
+              <a:rPr lang="de-DE"/>
               <a:t>XML Technology | BlackJack | Urban, Seeser, Rienau, Mitterer, Ehler | Garching, 08/30/17</a:t>
             </a:r>
-            <a:endParaRPr lang="en-US" dirty="0" smtClean="0"/>
+            <a:endParaRPr lang="en-US" dirty="0"/>
           </a:p>
         </p:txBody>
       </p:sp>
@@ -3350,32 +3317,27 @@
           <a:p>
             <a:pPr lvl="0"/>
             <a:r>
-              <a:rPr lang="de-DE" noProof="0" dirty="0" smtClean="0"/>
+              <a:rPr lang="de-DE" noProof="0" dirty="0"/>
               <a:t>Präsentationsmuster</a:t>
             </a:r>
             <a:br>
-              <a:rPr lang="de-DE" noProof="0" dirty="0" smtClean="0"/>
+              <a:rPr lang="de-DE" noProof="0" dirty="0"/>
             </a:br>
-            <a:r>
-              <a:rPr lang="de-DE" noProof="0" dirty="0" smtClean="0"/>
-              <a:t/>
-            </a:r>
             <a:br>
-              <a:rPr lang="de-DE" noProof="0" dirty="0" smtClean="0"/>
+              <a:rPr lang="de-DE" noProof="0" dirty="0"/>
             </a:br>
             <a:r>
-              <a:rPr lang="de-DE" noProof="0" dirty="0" smtClean="0"/>
+              <a:rPr lang="de-DE" noProof="0" dirty="0"/>
               <a:t>kann auch als </a:t>
             </a:r>
             <a:r>
-              <a:rPr lang="de-DE" noProof="0" dirty="0" err="1" smtClean="0"/>
+              <a:rPr lang="de-DE" noProof="0" dirty="0" err="1"/>
               <a:t>Kapiteltrenner</a:t>
             </a:r>
             <a:r>
-              <a:rPr lang="de-DE" noProof="0" dirty="0" smtClean="0"/>
+              <a:rPr lang="de-DE" noProof="0" dirty="0"/>
               <a:t> verwendet werden</a:t>
             </a:r>
-            <a:endParaRPr lang="de-DE" noProof="0" dirty="0"/>
           </a:p>
         </p:txBody>
       </p:sp>
@@ -3389,13 +3351,6 @@
   <p:clrMapOvr>
     <a:masterClrMapping/>
   </p:clrMapOvr>
-  <p:timing>
-    <p:tnLst>
-      <p:par>
-        <p:cTn xmlns:p14="http://schemas.microsoft.com/office/powerpoint/2010/main" id="1" dur="indefinite" restart="never" nodeType="tmRoot"/>
-      </p:par>
-    </p:tnLst>
-  </p:timing>
 </p:sldLayout>
 </file>
 
@@ -3449,7 +3404,7 @@
           </a:lstStyle>
           <a:p>
             <a:r>
-              <a:rPr lang="de-DE" noProof="0" smtClean="0"/>
+              <a:rPr lang="de-DE" noProof="0"/>
               <a:t>Titelmasterformat durch Klicken bearbeiten</a:t>
             </a:r>
             <a:endParaRPr lang="de-DE" noProof="0" dirty="0"/>
@@ -3538,38 +3493,37 @@
           <a:p>
             <a:pPr lvl="0"/>
             <a:r>
-              <a:rPr lang="de-DE" noProof="0" dirty="0" smtClean="0"/>
+              <a:rPr lang="de-DE" noProof="0" dirty="0"/>
               <a:t>Textmasterformat bearbeiten</a:t>
             </a:r>
           </a:p>
           <a:p>
             <a:pPr lvl="1"/>
             <a:r>
-              <a:rPr lang="de-DE" noProof="0" dirty="0" smtClean="0"/>
+              <a:rPr lang="de-DE" noProof="0" dirty="0"/>
               <a:t>Zweite Ebene</a:t>
             </a:r>
           </a:p>
           <a:p>
             <a:pPr lvl="2"/>
             <a:r>
-              <a:rPr lang="de-DE" noProof="0" dirty="0" smtClean="0"/>
+              <a:rPr lang="de-DE" noProof="0" dirty="0"/>
               <a:t>Dritte Ebene</a:t>
             </a:r>
           </a:p>
           <a:p>
             <a:pPr lvl="3"/>
             <a:r>
-              <a:rPr lang="de-DE" noProof="0" dirty="0" smtClean="0"/>
+              <a:rPr lang="de-DE" noProof="0" dirty="0"/>
               <a:t>Vierte Ebene</a:t>
             </a:r>
           </a:p>
           <a:p>
             <a:pPr lvl="4"/>
             <a:r>
-              <a:rPr lang="de-DE" noProof="0" dirty="0" smtClean="0"/>
+              <a:rPr lang="de-DE" noProof="0" dirty="0"/>
               <a:t>Fünfte Ebene</a:t>
             </a:r>
-            <a:endParaRPr lang="de-DE" noProof="0" dirty="0"/>
           </a:p>
         </p:txBody>
       </p:sp>
@@ -3604,10 +3558,9 @@
               <a:defRPr/>
             </a:pPr>
             <a:r>
-              <a:rPr lang="de-DE" noProof="0" smtClean="0"/>
+              <a:rPr lang="de-DE" noProof="0"/>
               <a:t>24.08.17</a:t>
             </a:r>
-            <a:endParaRPr lang="de-DE" noProof="0"/>
           </a:p>
         </p:txBody>
       </p:sp>
@@ -3642,7 +3595,7 @@
           </a:lstStyle>
           <a:p>
             <a:r>
-              <a:rPr lang="de-DE" smtClean="0"/>
+              <a:rPr lang="de-DE"/>
               <a:t>XML Technology | BlackJack | Urban, Seeser, Rienau, Mitterer, Ehler | Garching, 08/30/17</a:t>
             </a:r>
             <a:endParaRPr lang="de-DE" dirty="0"/>
@@ -3859,10 +3812,9 @@
           <a:p>
             <a:pPr lvl="0"/>
             <a:r>
-              <a:rPr lang="de-DE" noProof="0" dirty="0" smtClean="0"/>
+              <a:rPr lang="de-DE" noProof="0" dirty="0"/>
               <a:t>Titel der Präsentation durch Klicken bearbeiten</a:t>
             </a:r>
-            <a:endParaRPr lang="de-DE" noProof="0" dirty="0"/>
           </a:p>
         </p:txBody>
       </p:sp>
@@ -3916,14 +3868,14 @@
           <a:p>
             <a:pPr lvl="0"/>
             <a:r>
-              <a:rPr lang="de-DE" noProof="0" dirty="0" smtClean="0"/>
+              <a:rPr lang="de-DE" noProof="0" dirty="0"/>
               <a:t>Referent</a:t>
             </a:r>
             <a:br>
-              <a:rPr lang="de-DE" noProof="0" dirty="0" smtClean="0"/>
+              <a:rPr lang="de-DE" noProof="0" dirty="0"/>
             </a:br>
             <a:r>
-              <a:rPr lang="de-DE" noProof="0" dirty="0" smtClean="0"/>
+              <a:rPr lang="de-DE" noProof="0" dirty="0"/>
               <a:t>Ort, Datum (Schreibweise: 00. Januar 2015)</a:t>
             </a:r>
           </a:p>
@@ -3985,10 +3937,10 @@
           </a:lstStyle>
           <a:p>
             <a:r>
-              <a:rPr lang="de-DE" smtClean="0"/>
+              <a:rPr lang="de-DE"/>
               <a:t>XML Technology | BlackJack | Urban, Seeser, Rienau, Mitterer, Ehler | Garching, 08/30/17</a:t>
             </a:r>
-            <a:endParaRPr lang="en-US" dirty="0" smtClean="0"/>
+            <a:endParaRPr lang="en-US" dirty="0"/>
           </a:p>
         </p:txBody>
       </p:sp>
@@ -4002,13 +3954,6 @@
   <p:clrMapOvr>
     <a:masterClrMapping/>
   </p:clrMapOvr>
-  <p:timing>
-    <p:tnLst>
-      <p:par>
-        <p:cTn xmlns:p14="http://schemas.microsoft.com/office/powerpoint/2010/main" id="1" dur="indefinite" restart="never" nodeType="tmRoot"/>
-      </p:par>
-    </p:tnLst>
-  </p:timing>
 </p:sldLayout>
 </file>
 
@@ -4079,14 +4024,14 @@
           <a:p>
             <a:pPr lvl="0"/>
             <a:r>
-              <a:rPr lang="de-DE" noProof="0" dirty="0" smtClean="0"/>
+              <a:rPr lang="de-DE" noProof="0" dirty="0"/>
               <a:t>Referent</a:t>
             </a:r>
             <a:br>
-              <a:rPr lang="de-DE" noProof="0" dirty="0" smtClean="0"/>
+              <a:rPr lang="de-DE" noProof="0" dirty="0"/>
             </a:br>
             <a:r>
-              <a:rPr lang="de-DE" noProof="0" dirty="0" smtClean="0"/>
+              <a:rPr lang="de-DE" noProof="0" dirty="0"/>
               <a:t>Ort, Datum (Schreibweise: 00. Januar 2015)</a:t>
             </a:r>
           </a:p>
@@ -4142,7 +4087,7 @@
               <a:buNone/>
               <a:tabLst/>
             </a:pPr>
-            <a:endParaRPr kumimoji="0" lang="de-DE" sz="2000" b="0" i="0" u="none" strike="noStrike" cap="none" normalizeH="0" baseline="0" smtClean="0">
+            <a:endParaRPr kumimoji="0" lang="de-DE" sz="2000" b="0" i="0" u="none" strike="noStrike" cap="none" normalizeH="0" baseline="0">
               <a:ln>
                 <a:noFill/>
               </a:ln>
@@ -4195,10 +4140,10 @@
           <a:lstStyle/>
           <a:p>
             <a:r>
-              <a:rPr lang="de-DE" smtClean="0"/>
+              <a:rPr lang="de-DE"/>
               <a:t>XML Technology | BlackJack | Urban, Seeser, Rienau, Mitterer, Ehler | Garching, 08/30/17</a:t>
             </a:r>
-            <a:endParaRPr lang="en-US" dirty="0" smtClean="0"/>
+            <a:endParaRPr lang="en-US" dirty="0"/>
           </a:p>
         </p:txBody>
       </p:sp>
@@ -4246,10 +4191,9 @@
           <a:p>
             <a:pPr lvl="0"/>
             <a:r>
-              <a:rPr lang="de-DE" noProof="0" dirty="0" smtClean="0"/>
+              <a:rPr lang="de-DE" noProof="0" dirty="0"/>
               <a:t>Titel durch Klicken bearbeiten</a:t>
             </a:r>
-            <a:endParaRPr lang="de-DE" noProof="0" dirty="0"/>
           </a:p>
         </p:txBody>
       </p:sp>
@@ -4263,13 +4207,6 @@
   <p:clrMapOvr>
     <a:masterClrMapping/>
   </p:clrMapOvr>
-  <p:timing>
-    <p:tnLst>
-      <p:par>
-        <p:cTn xmlns:p14="http://schemas.microsoft.com/office/powerpoint/2010/main" id="1" dur="indefinite" restart="never" nodeType="tmRoot"/>
-      </p:par>
-    </p:tnLst>
-  </p:timing>
 </p:sldLayout>
 </file>
 
@@ -4336,14 +4273,14 @@
           <a:p>
             <a:pPr lvl="0"/>
             <a:r>
-              <a:rPr lang="de-DE" noProof="0" dirty="0" smtClean="0"/>
+              <a:rPr lang="de-DE" noProof="0" dirty="0"/>
               <a:t>Referent</a:t>
             </a:r>
             <a:br>
-              <a:rPr lang="de-DE" noProof="0" dirty="0" smtClean="0"/>
+              <a:rPr lang="de-DE" noProof="0" dirty="0"/>
             </a:br>
             <a:r>
-              <a:rPr lang="de-DE" noProof="0" dirty="0" smtClean="0"/>
+              <a:rPr lang="de-DE" noProof="0" dirty="0"/>
               <a:t>Ort, Datum (Schreibweise: 00. Januar 2015)</a:t>
             </a:r>
           </a:p>
@@ -4399,7 +4336,7 @@
               <a:buNone/>
               <a:tabLst/>
             </a:pPr>
-            <a:endParaRPr kumimoji="0" lang="de-DE" sz="2000" b="0" i="0" u="none" strike="noStrike" cap="none" normalizeH="0" baseline="0" smtClean="0">
+            <a:endParaRPr kumimoji="0" lang="de-DE" sz="2000" b="0" i="0" u="none" strike="noStrike" cap="none" normalizeH="0" baseline="0">
               <a:ln>
                 <a:noFill/>
               </a:ln>
@@ -4452,10 +4389,10 @@
           <a:lstStyle/>
           <a:p>
             <a:r>
-              <a:rPr lang="de-DE" smtClean="0"/>
+              <a:rPr lang="de-DE"/>
               <a:t>XML Technology | BlackJack | Urban, Seeser, Rienau, Mitterer, Ehler | Garching, 08/30/17</a:t>
             </a:r>
-            <a:endParaRPr lang="en-US" dirty="0" smtClean="0"/>
+            <a:endParaRPr lang="en-US" dirty="0"/>
           </a:p>
         </p:txBody>
       </p:sp>
@@ -4503,10 +4440,9 @@
           <a:p>
             <a:pPr lvl="0"/>
             <a:r>
-              <a:rPr lang="de-DE" noProof="0" dirty="0" smtClean="0"/>
+              <a:rPr lang="de-DE" noProof="0" dirty="0"/>
               <a:t>Titel durch Klicken bearbeiten</a:t>
             </a:r>
-            <a:endParaRPr lang="de-DE" noProof="0" dirty="0"/>
           </a:p>
         </p:txBody>
       </p:sp>
@@ -4520,13 +4456,6 @@
   <p:clrMapOvr>
     <a:masterClrMapping/>
   </p:clrMapOvr>
-  <p:timing>
-    <p:tnLst>
-      <p:par>
-        <p:cTn xmlns:p14="http://schemas.microsoft.com/office/powerpoint/2010/main" id="1" dur="indefinite" restart="never" nodeType="tmRoot"/>
-      </p:par>
-    </p:tnLst>
-  </p:timing>
 </p:sldLayout>
 </file>
 
@@ -4599,21 +4528,21 @@
           <a:p>
             <a:pPr lvl="0"/>
             <a:r>
-              <a:rPr lang="de-DE" noProof="0" dirty="0" smtClean="0"/>
+              <a:rPr lang="de-DE" noProof="0" dirty="0"/>
               <a:t>Inhalt durch Klicken bearbeiten</a:t>
             </a:r>
           </a:p>
           <a:p>
             <a:pPr lvl="1"/>
             <a:r>
-              <a:rPr lang="de-DE" noProof="0" dirty="0" smtClean="0"/>
+              <a:rPr lang="de-DE" noProof="0" dirty="0"/>
               <a:t>Zweite Ebene</a:t>
             </a:r>
           </a:p>
           <a:p>
             <a:pPr lvl="2"/>
             <a:r>
-              <a:rPr lang="de-DE" noProof="0" dirty="0" smtClean="0"/>
+              <a:rPr lang="de-DE" noProof="0" dirty="0"/>
               <a:t>Dritte Ebene</a:t>
             </a:r>
           </a:p>
@@ -4659,10 +4588,10 @@
           <a:lstStyle/>
           <a:p>
             <a:r>
-              <a:rPr lang="de-DE" smtClean="0"/>
+              <a:rPr lang="de-DE"/>
               <a:t>XML Technology | BlackJack | Urban, Seeser, Rienau, Mitterer, Ehler | Garching, 08/30/17</a:t>
             </a:r>
-            <a:endParaRPr lang="en-US" dirty="0" smtClean="0"/>
+            <a:endParaRPr lang="en-US" dirty="0"/>
           </a:p>
         </p:txBody>
       </p:sp>
@@ -4710,10 +4639,9 @@
           <a:p>
             <a:pPr lvl="0"/>
             <a:r>
-              <a:rPr lang="de-DE" noProof="0" dirty="0" smtClean="0"/>
+              <a:rPr lang="de-DE" noProof="0" dirty="0"/>
               <a:t>Titel durch Klicken bearbeiten</a:t>
             </a:r>
-            <a:endParaRPr lang="de-DE" noProof="0" dirty="0"/>
           </a:p>
         </p:txBody>
       </p:sp>
@@ -4727,13 +4655,6 @@
   <p:clrMapOvr>
     <a:masterClrMapping/>
   </p:clrMapOvr>
-  <p:timing>
-    <p:tnLst>
-      <p:par>
-        <p:cTn xmlns:p14="http://schemas.microsoft.com/office/powerpoint/2010/main" id="1" dur="indefinite" restart="never" nodeType="tmRoot"/>
-      </p:par>
-    </p:tnLst>
-  </p:timing>
 </p:sldLayout>
 </file>
 
@@ -4805,24 +4726,24 @@
           <a:p>
             <a:pPr lvl="0"/>
             <a:r>
-              <a:rPr lang="de-DE" noProof="0" dirty="0" smtClean="0"/>
+              <a:rPr lang="de-DE" noProof="0" dirty="0"/>
               <a:t>Inhalt durch Klicken bearbeiten</a:t>
             </a:r>
           </a:p>
           <a:p>
             <a:pPr lvl="1"/>
             <a:r>
-              <a:rPr lang="de-DE" noProof="0" dirty="0" smtClean="0"/>
+              <a:rPr lang="de-DE" noProof="0" dirty="0"/>
               <a:t>Zweite Ebene</a:t>
             </a:r>
           </a:p>
           <a:p>
             <a:pPr lvl="2"/>
             <a:r>
-              <a:rPr lang="de-DE" sz="1600" noProof="0" dirty="0" smtClean="0"/>
+              <a:rPr lang="de-DE" sz="1600" noProof="0" dirty="0"/>
               <a:t>Dritte Ebene</a:t>
             </a:r>
-            <a:endParaRPr lang="de-DE" noProof="0" dirty="0" smtClean="0"/>
+            <a:endParaRPr lang="de-DE" noProof="0" dirty="0"/>
           </a:p>
         </p:txBody>
       </p:sp>
@@ -4866,10 +4787,10 @@
           <a:lstStyle/>
           <a:p>
             <a:r>
-              <a:rPr lang="de-DE" smtClean="0"/>
+              <a:rPr lang="de-DE"/>
               <a:t>XML Technology | BlackJack | Urban, Seeser, Rienau, Mitterer, Ehler | Garching, 08/30/17</a:t>
             </a:r>
-            <a:endParaRPr lang="en-US" dirty="0" smtClean="0"/>
+            <a:endParaRPr lang="en-US" dirty="0"/>
           </a:p>
         </p:txBody>
       </p:sp>
@@ -4915,7 +4836,7 @@
           <a:p>
             <a:pPr lvl="0"/>
             <a:r>
-              <a:rPr lang="de-DE" noProof="0" dirty="0" smtClean="0"/>
+              <a:rPr lang="de-DE" noProof="0" dirty="0"/>
               <a:t>Inhalt durch Klicken bearbeiten</a:t>
             </a:r>
           </a:p>
@@ -4965,10 +4886,9 @@
           <a:p>
             <a:pPr lvl="0"/>
             <a:r>
-              <a:rPr lang="de-DE" noProof="0" dirty="0" smtClean="0"/>
+              <a:rPr lang="de-DE" noProof="0" dirty="0"/>
               <a:t>Titel durch Klicken bearbeiten</a:t>
             </a:r>
-            <a:endParaRPr lang="de-DE" noProof="0" dirty="0"/>
           </a:p>
         </p:txBody>
       </p:sp>
@@ -4982,13 +4902,6 @@
   <p:clrMapOvr>
     <a:masterClrMapping/>
   </p:clrMapOvr>
-  <p:timing>
-    <p:tnLst>
-      <p:par>
-        <p:cTn xmlns:p14="http://schemas.microsoft.com/office/powerpoint/2010/main" id="1" dur="indefinite" restart="never" nodeType="tmRoot"/>
-      </p:par>
-    </p:tnLst>
-  </p:timing>
 </p:sldLayout>
 </file>
 
@@ -5061,24 +4974,24 @@
           <a:p>
             <a:pPr lvl="0"/>
             <a:r>
-              <a:rPr lang="de-DE" noProof="0" dirty="0" smtClean="0"/>
+              <a:rPr lang="de-DE" noProof="0" dirty="0"/>
               <a:t>Inhalt durch Klicken bearbeiten</a:t>
             </a:r>
           </a:p>
           <a:p>
             <a:pPr lvl="1"/>
             <a:r>
-              <a:rPr lang="de-DE" noProof="0" dirty="0" smtClean="0"/>
+              <a:rPr lang="de-DE" noProof="0" dirty="0"/>
               <a:t>Zweite Ebene</a:t>
             </a:r>
           </a:p>
           <a:p>
             <a:pPr lvl="2"/>
             <a:r>
-              <a:rPr lang="de-DE" sz="1600" noProof="0" dirty="0" smtClean="0"/>
+              <a:rPr lang="de-DE" sz="1600" noProof="0" dirty="0"/>
               <a:t>Dritte Ebene</a:t>
             </a:r>
-            <a:endParaRPr lang="de-DE" noProof="0" dirty="0" smtClean="0"/>
+            <a:endParaRPr lang="de-DE" noProof="0" dirty="0"/>
           </a:p>
         </p:txBody>
       </p:sp>
@@ -5134,24 +5047,24 @@
           <a:p>
             <a:pPr lvl="0"/>
             <a:r>
-              <a:rPr lang="de-DE" noProof="0" dirty="0" smtClean="0"/>
+              <a:rPr lang="de-DE" noProof="0" dirty="0"/>
               <a:t>Inhalt durch Klicken bearbeiten</a:t>
             </a:r>
           </a:p>
           <a:p>
             <a:pPr lvl="1"/>
             <a:r>
-              <a:rPr lang="de-DE" noProof="0" dirty="0" smtClean="0"/>
+              <a:rPr lang="de-DE" noProof="0" dirty="0"/>
               <a:t>Zweite Ebene</a:t>
             </a:r>
           </a:p>
           <a:p>
             <a:pPr lvl="2"/>
             <a:r>
-              <a:rPr lang="de-DE" sz="1600" noProof="0" dirty="0" smtClean="0"/>
+              <a:rPr lang="de-DE" sz="1600" noProof="0" dirty="0"/>
               <a:t>Dritte Ebene</a:t>
             </a:r>
-            <a:endParaRPr lang="de-DE" noProof="0" dirty="0" smtClean="0"/>
+            <a:endParaRPr lang="de-DE" noProof="0" dirty="0"/>
           </a:p>
         </p:txBody>
       </p:sp>
@@ -5195,10 +5108,10 @@
           <a:lstStyle/>
           <a:p>
             <a:r>
-              <a:rPr lang="de-DE" smtClean="0"/>
+              <a:rPr lang="de-DE"/>
               <a:t>XML Technology | BlackJack | Urban, Seeser, Rienau, Mitterer, Ehler | Garching, 08/30/17</a:t>
             </a:r>
-            <a:endParaRPr lang="en-US" dirty="0" smtClean="0"/>
+            <a:endParaRPr lang="en-US" dirty="0"/>
           </a:p>
         </p:txBody>
       </p:sp>
@@ -5246,10 +5159,9 @@
           <a:p>
             <a:pPr lvl="0"/>
             <a:r>
-              <a:rPr lang="de-DE" noProof="0" dirty="0" smtClean="0"/>
+              <a:rPr lang="de-DE" noProof="0" dirty="0"/>
               <a:t>Titel durch Klicken bearbeiten</a:t>
             </a:r>
-            <a:endParaRPr lang="de-DE" noProof="0" dirty="0"/>
           </a:p>
         </p:txBody>
       </p:sp>
@@ -5263,13 +5175,6 @@
   <p:clrMapOvr>
     <a:masterClrMapping/>
   </p:clrMapOvr>
-  <p:timing>
-    <p:tnLst>
-      <p:par>
-        <p:cTn xmlns:p14="http://schemas.microsoft.com/office/powerpoint/2010/main" id="1" dur="indefinite" restart="never" nodeType="tmRoot"/>
-      </p:par>
-    </p:tnLst>
-  </p:timing>
 </p:sldLayout>
 </file>
 
@@ -5333,7 +5238,7 @@
           <a:p>
             <a:pPr lvl="0"/>
             <a:r>
-              <a:rPr lang="de-DE" noProof="0" dirty="0" smtClean="0"/>
+              <a:rPr lang="de-DE" noProof="0" dirty="0"/>
               <a:t>Inhalt durch Klicken bearbeiten</a:t>
             </a:r>
           </a:p>
@@ -5379,7 +5284,7 @@
           <a:lstStyle/>
           <a:p>
             <a:r>
-              <a:rPr lang="de-DE" noProof="0" smtClean="0"/>
+              <a:rPr lang="de-DE" noProof="0"/>
               <a:t>XML Technology | BlackJack | Urban, Seeser, Rienau, Mitterer, Ehler | Garching, 08/30/17</a:t>
             </a:r>
           </a:p>
@@ -5427,24 +5332,24 @@
           <a:p>
             <a:pPr lvl="0"/>
             <a:r>
-              <a:rPr lang="de-DE" dirty="0" smtClean="0"/>
+              <a:rPr lang="de-DE" dirty="0"/>
               <a:t>Textmasterformate durch Klicken bearbeiten</a:t>
             </a:r>
           </a:p>
           <a:p>
             <a:pPr lvl="1"/>
             <a:r>
-              <a:rPr lang="de-DE" dirty="0" smtClean="0"/>
+              <a:rPr lang="de-DE" dirty="0"/>
               <a:t>Zweite Ebene</a:t>
             </a:r>
           </a:p>
           <a:p>
             <a:pPr lvl="2"/>
             <a:r>
-              <a:rPr lang="de-DE" sz="1600" dirty="0" smtClean="0"/>
+              <a:rPr lang="de-DE" sz="1600" dirty="0"/>
               <a:t>Dritte Ebene</a:t>
             </a:r>
-            <a:endParaRPr lang="de-DE" dirty="0" smtClean="0"/>
+            <a:endParaRPr lang="de-DE" dirty="0"/>
           </a:p>
         </p:txBody>
       </p:sp>
@@ -5526,10 +5431,9 @@
           <a:p>
             <a:pPr lvl="0"/>
             <a:r>
-              <a:rPr lang="de-DE" noProof="0" dirty="0" smtClean="0"/>
+              <a:rPr lang="de-DE" noProof="0" dirty="0"/>
               <a:t>Titel durch Klicken bearbeiten</a:t>
             </a:r>
-            <a:endParaRPr lang="de-DE" noProof="0" dirty="0"/>
           </a:p>
         </p:txBody>
       </p:sp>
@@ -5543,13 +5447,6 @@
   <p:clrMapOvr>
     <a:masterClrMapping/>
   </p:clrMapOvr>
-  <p:timing>
-    <p:tnLst>
-      <p:par>
-        <p:cTn xmlns:p14="http://schemas.microsoft.com/office/powerpoint/2010/main" id="1" dur="indefinite" restart="never" nodeType="tmRoot"/>
-      </p:par>
-    </p:tnLst>
-  </p:timing>
 </p:sldLayout>
 </file>
 
@@ -5631,10 +5528,10 @@
           </a:lstStyle>
           <a:p>
             <a:r>
-              <a:rPr lang="de-DE" smtClean="0"/>
+              <a:rPr lang="de-DE"/>
               <a:t>XML Technology | BlackJack | Urban, Seeser, Rienau, Mitterer, Ehler | Garching, 08/30/17</a:t>
             </a:r>
-            <a:endParaRPr lang="en-US" dirty="0" smtClean="0"/>
+            <a:endParaRPr lang="en-US" dirty="0"/>
           </a:p>
         </p:txBody>
       </p:sp>
@@ -5685,13 +5582,6 @@
     <p:sldLayoutId id="2147483664" r:id="rId1"/>
     <p:sldLayoutId id="2147483712" r:id="rId2"/>
   </p:sldLayoutIdLst>
-  <p:timing>
-    <p:tnLst>
-      <p:par>
-        <p:cTn xmlns:p14="http://schemas.microsoft.com/office/powerpoint/2010/main" id="1" dur="indefinite" restart="never" nodeType="tmRoot"/>
-      </p:par>
-    </p:tnLst>
-  </p:timing>
   <p:hf hdr="0" dt="0"/>
   <p:txStyles>
     <p:titleStyle>
@@ -6159,7 +6049,7 @@
               </a:pPr>
               <a:t>‹Nr.›</a:t>
             </a:fld>
-            <a:endParaRPr lang="de-DE" sz="1200" dirty="0" smtClean="0">
+            <a:endParaRPr lang="de-DE" sz="1200" dirty="0">
               <a:latin typeface="+mn-lt"/>
               <a:cs typeface="Arial" pitchFamily="34" charset="0"/>
             </a:endParaRPr>
@@ -6287,10 +6177,10 @@
           </a:lstStyle>
           <a:p>
             <a:r>
-              <a:rPr lang="de-DE" smtClean="0"/>
+              <a:rPr lang="de-DE"/>
               <a:t>XML Technology | BlackJack | Urban, Seeser, Rienau, Mitterer, Ehler | Garching, 08/30/17</a:t>
             </a:r>
-            <a:endParaRPr lang="en-US" dirty="0" smtClean="0"/>
+            <a:endParaRPr lang="en-US" dirty="0"/>
           </a:p>
         </p:txBody>
       </p:sp>
@@ -6300,13 +6190,6 @@
   <p:sldLayoutIdLst>
     <p:sldLayoutId id="2147483669" r:id="rId1"/>
   </p:sldLayoutIdLst>
-  <p:timing>
-    <p:tnLst>
-      <p:par>
-        <p:cTn xmlns:p14="http://schemas.microsoft.com/office/powerpoint/2010/main" id="1" dur="indefinite" restart="never" nodeType="tmRoot"/>
-      </p:par>
-    </p:tnLst>
-  </p:timing>
   <p:hf hdr="0" dt="0"/>
   <p:txStyles>
     <p:titleStyle>
@@ -6808,10 +6691,10 @@
           </a:lstStyle>
           <a:p>
             <a:r>
-              <a:rPr lang="de-DE" smtClean="0"/>
+              <a:rPr lang="de-DE"/>
               <a:t>XML Technology | BlackJack | Urban, Seeser, Rienau, Mitterer, Ehler | Garching, 08/30/17</a:t>
             </a:r>
-            <a:endParaRPr lang="en-US" dirty="0" smtClean="0"/>
+            <a:endParaRPr lang="en-US" dirty="0"/>
           </a:p>
         </p:txBody>
       </p:sp>
@@ -6868,7 +6751,7 @@
               <a:tabLst/>
             </a:pPr>
             <a:r>
-              <a:rPr lang="de-DE" sz="800" dirty="0" smtClean="0">
+              <a:rPr lang="de-DE" sz="800" dirty="0">
                 <a:solidFill>
                   <a:schemeClr val="tx2"/>
                 </a:solidFill>
@@ -6885,7 +6768,7 @@
               <a:tabLst/>
             </a:pPr>
             <a:r>
-              <a:rPr lang="de-DE" sz="800" dirty="0" smtClean="0">
+              <a:rPr lang="de-DE" sz="800" dirty="0">
                 <a:solidFill>
                   <a:schemeClr val="tx2"/>
                 </a:solidFill>
@@ -6902,7 +6785,7 @@
               <a:tabLst/>
             </a:pPr>
             <a:r>
-              <a:rPr lang="de-DE" sz="800" dirty="0" smtClean="0">
+              <a:rPr lang="de-DE" sz="800" dirty="0">
                 <a:solidFill>
                   <a:schemeClr val="tx2"/>
                 </a:solidFill>
@@ -6911,7 +6794,7 @@
               <a:t>Technische Universität</a:t>
             </a:r>
             <a:r>
-              <a:rPr lang="de-DE" sz="800" baseline="0" dirty="0" smtClean="0">
+              <a:rPr lang="de-DE" sz="800" baseline="0" dirty="0">
                 <a:solidFill>
                   <a:schemeClr val="tx2"/>
                 </a:solidFill>
@@ -6919,7 +6802,7 @@
               </a:rPr>
               <a:t> München</a:t>
             </a:r>
-            <a:endParaRPr lang="de-DE" sz="800" dirty="0" smtClean="0">
+            <a:endParaRPr lang="de-DE" sz="800" dirty="0">
               <a:solidFill>
                 <a:schemeClr val="tx2"/>
               </a:solidFill>
@@ -6934,13 +6817,6 @@
   <p:sldLayoutIdLst>
     <p:sldLayoutId id="2147483675" r:id="rId1"/>
   </p:sldLayoutIdLst>
-  <p:timing>
-    <p:tnLst>
-      <p:par>
-        <p:cTn xmlns:p14="http://schemas.microsoft.com/office/powerpoint/2010/main" id="1" dur="indefinite" restart="never" nodeType="tmRoot"/>
-      </p:par>
-    </p:tnLst>
-  </p:timing>
   <p:hf hdr="0" dt="0"/>
   <p:txStyles>
     <p:titleStyle>
@@ -7466,10 +7342,10 @@
           </a:lstStyle>
           <a:p>
             <a:r>
-              <a:rPr lang="de-DE" smtClean="0"/>
+              <a:rPr lang="de-DE"/>
               <a:t>XML Technology | BlackJack | Urban, Seeser, Rienau, Mitterer, Ehler | Garching, 08/30/17</a:t>
             </a:r>
-            <a:endParaRPr lang="en-US" dirty="0" smtClean="0"/>
+            <a:endParaRPr lang="en-US" dirty="0"/>
           </a:p>
         </p:txBody>
       </p:sp>
@@ -7486,13 +7362,6 @@
     <p:sldLayoutId id="2147483653" r:id="rId7"/>
     <p:sldLayoutId id="2147483656" r:id="rId8"/>
   </p:sldLayoutIdLst>
-  <p:timing>
-    <p:tnLst>
-      <p:par>
-        <p:cTn xmlns:p14="http://schemas.microsoft.com/office/powerpoint/2010/main" id="1" dur="indefinite" restart="never" nodeType="tmRoot"/>
-      </p:par>
-    </p:tnLst>
-  </p:timing>
   <p:hf hdr="0" dt="0"/>
   <p:txStyles>
     <p:titleStyle>
@@ -7970,7 +7839,7 @@
                 <a:spcPct val="114000"/>
               </a:lnSpc>
             </a:pPr>
-            <a:endParaRPr lang="de-DE" dirty="0" smtClean="0"/>
+            <a:endParaRPr lang="de-DE" dirty="0"/>
           </a:p>
         </p:txBody>
       </p:sp>
@@ -8070,10 +7939,10 @@
           </a:lstStyle>
           <a:p>
             <a:r>
-              <a:rPr lang="de-DE" smtClean="0"/>
+              <a:rPr lang="de-DE"/>
               <a:t>XML Technology | BlackJack | Urban, Seeser, Rienau, Mitterer, Ehler | Garching, 08/30/17</a:t>
             </a:r>
-            <a:endParaRPr lang="en-US" dirty="0" smtClean="0"/>
+            <a:endParaRPr lang="en-US" dirty="0"/>
           </a:p>
         </p:txBody>
       </p:sp>
@@ -8083,13 +7952,6 @@
   <p:sldLayoutIdLst>
     <p:sldLayoutId id="2147483685" r:id="rId1"/>
   </p:sldLayoutIdLst>
-  <p:timing>
-    <p:tnLst>
-      <p:par>
-        <p:cTn xmlns:p14="http://schemas.microsoft.com/office/powerpoint/2010/main" id="1" dur="indefinite" restart="never" nodeType="tmRoot"/>
-      </p:par>
-    </p:tnLst>
-  </p:timing>
   <p:hf hdr="0" dt="0"/>
   <p:txStyles>
     <p:titleStyle>
@@ -8570,7 +8432,7 @@
                 <a:spcPct val="114000"/>
               </a:lnSpc>
             </a:pPr>
-            <a:endParaRPr lang="de-DE" dirty="0" smtClean="0">
+            <a:endParaRPr lang="de-DE" dirty="0">
               <a:solidFill>
                 <a:schemeClr val="bg1"/>
               </a:solidFill>
@@ -8674,10 +8536,10 @@
           </a:lstStyle>
           <a:p>
             <a:r>
-              <a:rPr lang="de-DE" smtClean="0"/>
+              <a:rPr lang="de-DE"/>
               <a:t>XML Technology | BlackJack | Urban, Seeser, Rienau, Mitterer, Ehler | Garching, 08/30/17</a:t>
             </a:r>
-            <a:endParaRPr lang="en-US" dirty="0" smtClean="0"/>
+            <a:endParaRPr lang="en-US" dirty="0"/>
           </a:p>
         </p:txBody>
       </p:sp>
@@ -8687,13 +8549,6 @@
   <p:sldLayoutIdLst>
     <p:sldLayoutId id="2147483698" r:id="rId1"/>
   </p:sldLayoutIdLst>
-  <p:timing>
-    <p:tnLst>
-      <p:par>
-        <p:cTn xmlns:p14="http://schemas.microsoft.com/office/powerpoint/2010/main" id="1" dur="indefinite" restart="never" nodeType="tmRoot"/>
-      </p:par>
-    </p:tnLst>
-  </p:timing>
   <p:hf hdr="0" dt="0"/>
   <p:txStyles>
     <p:titleStyle>
@@ -9140,82 +8995,73 @@
           <a:p>
             <a:pPr algn="ctr"/>
             <a:r>
-              <a:rPr lang="de-DE" sz="2000" dirty="0" err="1" smtClean="0"/>
+              <a:rPr lang="de-DE" sz="2000" dirty="0" err="1"/>
               <a:t>BlackJack</a:t>
             </a:r>
             <a:r>
-              <a:rPr lang="de-DE" sz="2000" dirty="0" smtClean="0"/>
+              <a:rPr lang="de-DE" sz="2000" dirty="0"/>
               <a:t> in XML</a:t>
             </a:r>
           </a:p>
           <a:p>
-            <a:endParaRPr lang="de-DE" dirty="0" smtClean="0"/>
-          </a:p>
-          <a:p>
             <a:endParaRPr lang="de-DE" dirty="0"/>
           </a:p>
           <a:p>
-            <a:r>
-              <a:rPr lang="de-DE" dirty="0" smtClean="0"/>
+            <a:endParaRPr lang="de-DE" dirty="0"/>
+          </a:p>
+          <a:p>
+            <a:r>
+              <a:rPr lang="de-DE" dirty="0"/>
               <a:t>Supervisor:  Prof. Dr. Anne Brüggemann-Klein</a:t>
             </a:r>
+          </a:p>
+          <a:p>
+            <a:r>
+              <a:rPr lang="de-DE" dirty="0"/>
+              <a:t>Developers: Robert Urban, Anne-Catherine </a:t>
+            </a:r>
+            <a:r>
+              <a:rPr lang="de-DE" dirty="0" err="1"/>
+              <a:t>Seeser</a:t>
+            </a:r>
+            <a:r>
+              <a:rPr lang="de-DE" dirty="0"/>
+              <a:t>, </a:t>
+            </a:r>
+            <a:r>
+              <a:rPr lang="de-DE" dirty="0" err="1"/>
+              <a:t>Lennert</a:t>
+            </a:r>
+            <a:r>
+              <a:rPr lang="de-DE" dirty="0"/>
+              <a:t> </a:t>
+            </a:r>
+            <a:r>
+              <a:rPr lang="de-DE" dirty="0" err="1"/>
+              <a:t>Rienau</a:t>
+            </a:r>
+            <a:r>
+              <a:rPr lang="de-DE" dirty="0"/>
+              <a:t>, </a:t>
+            </a:r>
+          </a:p>
+          <a:p>
+            <a:r>
+              <a:rPr lang="de-DE" dirty="0"/>
+              <a:t>	    Michael Mitterer, Manuel </a:t>
+            </a:r>
+            <a:r>
+              <a:rPr lang="de-DE" dirty="0" err="1"/>
+              <a:t>Ehler</a:t>
+            </a:r>
             <a:endParaRPr lang="de-DE" dirty="0"/>
           </a:p>
           <a:p>
-            <a:r>
-              <a:rPr lang="de-DE" dirty="0" smtClean="0"/>
-              <a:t>Developers: Robert Urban, Anne-Catherine </a:t>
-            </a:r>
-            <a:r>
-              <a:rPr lang="de-DE" dirty="0" err="1" smtClean="0"/>
-              <a:t>Seeser</a:t>
-            </a:r>
-            <a:r>
-              <a:rPr lang="de-DE" dirty="0" smtClean="0"/>
-              <a:t>, </a:t>
-            </a:r>
-            <a:r>
-              <a:rPr lang="de-DE" dirty="0" err="1" smtClean="0"/>
-              <a:t>Lennert</a:t>
-            </a:r>
-            <a:r>
-              <a:rPr lang="de-DE" dirty="0" smtClean="0"/>
-              <a:t> </a:t>
-            </a:r>
-            <a:r>
-              <a:rPr lang="de-DE" dirty="0" err="1" smtClean="0"/>
-              <a:t>Rienau</a:t>
-            </a:r>
+            <a:endParaRPr lang="de-DE" dirty="0"/>
+          </a:p>
+          <a:p>
             <a:r>
               <a:rPr lang="de-DE" dirty="0"/>
-              <a:t>,</a:t>
-            </a:r>
-            <a:r>
-              <a:rPr lang="de-DE" dirty="0" smtClean="0"/>
-              <a:t> </a:t>
-            </a:r>
-          </a:p>
-          <a:p>
-            <a:r>
-              <a:rPr lang="de-DE" dirty="0"/>
-              <a:t>	</a:t>
-            </a:r>
-            <a:r>
-              <a:rPr lang="de-DE" dirty="0" smtClean="0"/>
-              <a:t>    Michael Mitterer, Manuel </a:t>
-            </a:r>
-            <a:r>
-              <a:rPr lang="de-DE" dirty="0" err="1" smtClean="0"/>
-              <a:t>Ehler</a:t>
-            </a:r>
-            <a:endParaRPr lang="de-DE" dirty="0"/>
-          </a:p>
-          <a:p>
-            <a:endParaRPr lang="de-DE" dirty="0" smtClean="0"/>
-          </a:p>
-          <a:p>
-            <a:r>
-              <a:rPr lang="de-DE" dirty="0" smtClean="0"/>
               <a:t>Garching, 08/30/2017</a:t>
             </a:r>
             <a:endParaRPr dirty="0"/>
@@ -9243,22 +9089,21 @@
           <a:lstStyle/>
           <a:p>
             <a:r>
-              <a:rPr lang="de-DE" dirty="0" err="1" smtClean="0"/>
+              <a:rPr lang="de-DE" dirty="0" err="1"/>
               <a:t>Practical</a:t>
             </a:r>
             <a:r>
-              <a:rPr lang="de-DE" dirty="0" smtClean="0"/>
+              <a:rPr lang="de-DE" dirty="0"/>
               <a:t> </a:t>
             </a:r>
             <a:r>
-              <a:rPr lang="de-DE" dirty="0" err="1" smtClean="0"/>
+              <a:rPr lang="de-DE" dirty="0" err="1"/>
               <a:t>Course</a:t>
             </a:r>
             <a:r>
-              <a:rPr lang="de-DE" dirty="0" smtClean="0"/>
+              <a:rPr lang="de-DE" dirty="0"/>
               <a:t>: XML Technology</a:t>
             </a:r>
-            <a:endParaRPr lang="de-DE" dirty="0"/>
           </a:p>
         </p:txBody>
       </p:sp>
@@ -9291,13 +9136,6 @@
   <p:clrMapOvr>
     <a:masterClrMapping/>
   </p:clrMapOvr>
-  <p:timing>
-    <p:tnLst>
-      <p:par>
-        <p:cTn xmlns:p14="http://schemas.microsoft.com/office/powerpoint/2010/main" id="1" dur="indefinite" restart="never" nodeType="tmRoot"/>
-      </p:par>
-    </p:tnLst>
-  </p:timing>
 </p:sld>
 </file>
 
@@ -9334,18 +9172,9 @@
           <a:lstStyle/>
           <a:p>
             <a:r>
-              <a:rPr lang="en-US" dirty="0" smtClean="0"/>
-              <a:t>6. </a:t>
-            </a:r>
-            <a:r>
               <a:rPr lang="en-US" dirty="0"/>
-              <a:t>Development – </a:t>
-            </a:r>
-            <a:r>
-              <a:rPr lang="en-US" dirty="0" smtClean="0"/>
-              <a:t>Phases</a:t>
-            </a:r>
-            <a:endParaRPr lang="en-US" dirty="0"/>
+              <a:t>6. Development – Phases</a:t>
+            </a:r>
           </a:p>
         </p:txBody>
       </p:sp>
@@ -9376,7 +9205,7 @@
               <a:buChar char="•"/>
             </a:pPr>
             <a:r>
-              <a:rPr lang="en-US" sz="1800" dirty="0" smtClean="0"/>
+              <a:rPr lang="en-US" sz="1800" dirty="0"/>
               <a:t>V Modell</a:t>
             </a:r>
           </a:p>
@@ -9386,7 +9215,7 @@
               <a:buChar char="•"/>
             </a:pPr>
             <a:r>
-              <a:rPr lang="en-US" sz="1800" dirty="0" smtClean="0"/>
+              <a:rPr lang="en-US" sz="1800" dirty="0"/>
               <a:t>Integrated agile development</a:t>
             </a:r>
           </a:p>
@@ -9413,72 +9242,68 @@
           <a:lstStyle/>
           <a:p>
             <a:r>
-              <a:rPr lang="de-DE" dirty="0" smtClean="0">
+              <a:rPr lang="de-DE" dirty="0">
                 <a:latin typeface="Arial"/>
                 <a:cs typeface="Arial"/>
               </a:rPr>
               <a:t>XML Technology | </a:t>
             </a:r>
             <a:r>
-              <a:rPr lang="de-DE" dirty="0" err="1" smtClean="0">
+              <a:rPr lang="de-DE" dirty="0" err="1">
                 <a:latin typeface="Arial"/>
                 <a:cs typeface="Arial"/>
               </a:rPr>
               <a:t>BlackJack</a:t>
             </a:r>
             <a:r>
-              <a:rPr lang="de-DE" dirty="0" smtClean="0">
+              <a:rPr lang="de-DE" dirty="0">
                 <a:latin typeface="Arial"/>
                 <a:cs typeface="Arial"/>
               </a:rPr>
               <a:t> | Urban, </a:t>
             </a:r>
             <a:r>
-              <a:rPr lang="de-DE" dirty="0" err="1" smtClean="0">
+              <a:rPr lang="de-DE" dirty="0" err="1">
                 <a:latin typeface="Arial"/>
                 <a:cs typeface="Arial"/>
               </a:rPr>
               <a:t>Seeser</a:t>
             </a:r>
             <a:r>
-              <a:rPr lang="de-DE" dirty="0" smtClean="0">
+              <a:rPr lang="de-DE" dirty="0">
                 <a:latin typeface="Arial"/>
                 <a:cs typeface="Arial"/>
               </a:rPr>
               <a:t>, </a:t>
             </a:r>
             <a:r>
-              <a:rPr lang="de-DE" dirty="0" err="1" smtClean="0">
+              <a:rPr lang="de-DE" dirty="0" err="1">
                 <a:latin typeface="Arial"/>
                 <a:cs typeface="Arial"/>
               </a:rPr>
               <a:t>Rienau</a:t>
             </a:r>
             <a:r>
-              <a:rPr lang="de-DE" dirty="0" smtClean="0">
+              <a:rPr lang="de-DE" dirty="0">
                 <a:latin typeface="Arial"/>
                 <a:cs typeface="Arial"/>
               </a:rPr>
               <a:t>, Mitterer, </a:t>
             </a:r>
             <a:r>
-              <a:rPr lang="de-DE" dirty="0" err="1" smtClean="0">
+              <a:rPr lang="de-DE" dirty="0" err="1">
                 <a:latin typeface="Arial"/>
                 <a:cs typeface="Arial"/>
               </a:rPr>
               <a:t>Ehler</a:t>
             </a:r>
             <a:r>
-              <a:rPr lang="de-DE" dirty="0" smtClean="0">
+              <a:rPr lang="de-DE" dirty="0">
                 <a:latin typeface="Arial"/>
                 <a:cs typeface="Arial"/>
               </a:rPr>
               <a:t> | Garching, 08/30/17</a:t>
             </a:r>
-            <a:endParaRPr lang="de-DE" dirty="0">
-              <a:latin typeface="Arial"/>
-              <a:cs typeface="Arial"/>
-            </a:endParaRPr>
           </a:p>
         </p:txBody>
       </p:sp>
@@ -9584,21 +9409,8 @@
             </a:r>
             <a:r>
               <a:rPr lang="en-US" sz="800" dirty="0"/>
-              <a:t>, </a:t>
-            </a:r>
-            <a:r>
-              <a:rPr lang="en-US" sz="800" dirty="0" smtClean="0"/>
-              <a:t>accessed </a:t>
-            </a:r>
-            <a:r>
-              <a:rPr lang="en-US" sz="800" dirty="0"/>
-              <a:t>on 08/24/17 at around 04:20 </a:t>
-            </a:r>
-            <a:r>
-              <a:rPr lang="en-US" sz="800" dirty="0" smtClean="0"/>
-              <a:t>PM</a:t>
-            </a:r>
-            <a:endParaRPr lang="en-US" sz="800" dirty="0"/>
+              <a:t>, accessed on 08/24/17 at around 04:20 PM</a:t>
+            </a:r>
           </a:p>
         </p:txBody>
       </p:sp>
@@ -9612,13 +9424,6 @@
   <p:clrMapOvr>
     <a:masterClrMapping/>
   </p:clrMapOvr>
-  <p:timing>
-    <p:tnLst>
-      <p:par>
-        <p:cTn xmlns:p14="http://schemas.microsoft.com/office/powerpoint/2010/main" id="1" dur="indefinite" restart="never" nodeType="tmRoot"/>
-      </p:par>
-    </p:tnLst>
-  </p:timing>
 </p:sld>
 </file>
 
@@ -9655,10 +9460,9 @@
           <a:lstStyle/>
           <a:p>
             <a:r>
-              <a:rPr lang="en-US" dirty="0" smtClean="0"/>
+              <a:rPr lang="en-US" dirty="0"/>
               <a:t>7. Conclusion</a:t>
             </a:r>
-            <a:endParaRPr lang="en-US" dirty="0"/>
           </a:p>
         </p:txBody>
       </p:sp>
@@ -9683,72 +9487,68 @@
           <a:lstStyle/>
           <a:p>
             <a:r>
-              <a:rPr lang="de-DE" dirty="0" smtClean="0">
+              <a:rPr lang="de-DE" dirty="0">
                 <a:latin typeface="Arial"/>
                 <a:cs typeface="Arial"/>
               </a:rPr>
               <a:t>XML Technology | </a:t>
             </a:r>
             <a:r>
-              <a:rPr lang="de-DE" dirty="0" err="1" smtClean="0">
+              <a:rPr lang="de-DE" dirty="0" err="1">
                 <a:latin typeface="Arial"/>
                 <a:cs typeface="Arial"/>
               </a:rPr>
               <a:t>BlackJack</a:t>
             </a:r>
             <a:r>
-              <a:rPr lang="de-DE" dirty="0" smtClean="0">
+              <a:rPr lang="de-DE" dirty="0">
                 <a:latin typeface="Arial"/>
                 <a:cs typeface="Arial"/>
               </a:rPr>
               <a:t> | Urban, </a:t>
             </a:r>
             <a:r>
-              <a:rPr lang="de-DE" dirty="0" err="1" smtClean="0">
+              <a:rPr lang="de-DE" dirty="0" err="1">
                 <a:latin typeface="Arial"/>
                 <a:cs typeface="Arial"/>
               </a:rPr>
               <a:t>Seeser</a:t>
             </a:r>
             <a:r>
-              <a:rPr lang="de-DE" dirty="0" smtClean="0">
+              <a:rPr lang="de-DE" dirty="0">
                 <a:latin typeface="Arial"/>
                 <a:cs typeface="Arial"/>
               </a:rPr>
               <a:t>, </a:t>
             </a:r>
             <a:r>
-              <a:rPr lang="de-DE" dirty="0" err="1" smtClean="0">
+              <a:rPr lang="de-DE" dirty="0" err="1">
                 <a:latin typeface="Arial"/>
                 <a:cs typeface="Arial"/>
               </a:rPr>
               <a:t>Rienau</a:t>
             </a:r>
             <a:r>
-              <a:rPr lang="de-DE" dirty="0" smtClean="0">
+              <a:rPr lang="de-DE" dirty="0">
                 <a:latin typeface="Arial"/>
                 <a:cs typeface="Arial"/>
               </a:rPr>
               <a:t>, Mitterer, </a:t>
             </a:r>
             <a:r>
-              <a:rPr lang="de-DE" dirty="0" err="1" smtClean="0">
+              <a:rPr lang="de-DE" dirty="0" err="1">
                 <a:latin typeface="Arial"/>
                 <a:cs typeface="Arial"/>
               </a:rPr>
               <a:t>Ehler</a:t>
             </a:r>
             <a:r>
-              <a:rPr lang="de-DE" dirty="0" smtClean="0">
+              <a:rPr lang="de-DE" dirty="0">
                 <a:latin typeface="Arial"/>
                 <a:cs typeface="Arial"/>
               </a:rPr>
               <a:t> | Garching, 08/30/17</a:t>
             </a:r>
-            <a:endParaRPr lang="de-DE" dirty="0">
-              <a:latin typeface="Arial"/>
-              <a:cs typeface="Arial"/>
-            </a:endParaRPr>
           </a:p>
         </p:txBody>
       </p:sp>
@@ -9813,40 +9613,24 @@
               </a:lnSpc>
             </a:pPr>
             <a:r>
-              <a:rPr lang="en-US" sz="800" dirty="0" smtClean="0">
-                <a:latin typeface="+mn-lt"/>
-              </a:rPr>
-              <a:t>Source</a:t>
-            </a:r>
-            <a:r>
               <a:rPr lang="en-US" sz="800" dirty="0">
                 <a:latin typeface="+mn-lt"/>
               </a:rPr>
-              <a:t>: </a:t>
+              <a:t>Source: </a:t>
             </a:r>
             <a:r>
               <a:rPr lang="en-US" sz="800" dirty="0">
                 <a:latin typeface="+mn-lt"/>
                 <a:hlinkClick r:id="rId3"/>
               </a:rPr>
-              <a:t>http://clipartix.com/wp-content/uploads/2016/04/Thumbs-up-clipart-cliparts-for-</a:t>
-            </a:r>
-            <a:r>
-              <a:rPr lang="en-US" sz="800" dirty="0" smtClean="0">
-                <a:latin typeface="+mn-lt"/>
-                <a:hlinkClick r:id="rId3"/>
-              </a:rPr>
-              <a:t>you.jpg</a:t>
-            </a:r>
-            <a:r>
-              <a:rPr lang="en-US" sz="800" dirty="0" smtClean="0">
+              <a:t>http://clipartix.com/wp-content/uploads/2016/04/Thumbs-up-clipart-cliparts-for-you.jpg</a:t>
+            </a:r>
+            <a:r>
+              <a:rPr lang="en-US" sz="800" dirty="0">
                 <a:latin typeface="+mn-lt"/>
               </a:rPr>
               <a:t>, accessed on 08/24/17 at around 04:33 PM</a:t>
             </a:r>
-            <a:endParaRPr lang="en-US" sz="800" dirty="0" smtClean="0">
-              <a:latin typeface="+mn-lt"/>
-            </a:endParaRPr>
           </a:p>
         </p:txBody>
       </p:sp>
@@ -9890,13 +9674,6 @@
   <p:clrMapOvr>
     <a:masterClrMapping/>
   </p:clrMapOvr>
-  <p:timing>
-    <p:tnLst>
-      <p:par>
-        <p:cTn xmlns:p14="http://schemas.microsoft.com/office/powerpoint/2010/main" id="1" dur="indefinite" restart="never" nodeType="tmRoot"/>
-      </p:par>
-    </p:tnLst>
-  </p:timing>
 </p:sld>
 </file>
 
@@ -9933,10 +9710,9 @@
           <a:lstStyle/>
           <a:p>
             <a:r>
-              <a:rPr lang="en-US" dirty="0" smtClean="0"/>
+              <a:rPr lang="en-US" dirty="0"/>
               <a:t>8. Demo – Overview GUI</a:t>
             </a:r>
-            <a:endParaRPr lang="en-US" dirty="0"/>
           </a:p>
         </p:txBody>
       </p:sp>
@@ -9961,72 +9737,68 @@
           <a:lstStyle/>
           <a:p>
             <a:r>
-              <a:rPr lang="de-DE" dirty="0" smtClean="0">
+              <a:rPr lang="de-DE" dirty="0">
                 <a:latin typeface="Arial"/>
                 <a:cs typeface="Arial"/>
               </a:rPr>
               <a:t>XML Technology | </a:t>
             </a:r>
             <a:r>
-              <a:rPr lang="de-DE" dirty="0" err="1" smtClean="0">
+              <a:rPr lang="de-DE" dirty="0" err="1">
                 <a:latin typeface="Arial"/>
                 <a:cs typeface="Arial"/>
               </a:rPr>
               <a:t>BlackJack</a:t>
             </a:r>
             <a:r>
-              <a:rPr lang="de-DE" dirty="0" smtClean="0">
+              <a:rPr lang="de-DE" dirty="0">
                 <a:latin typeface="Arial"/>
                 <a:cs typeface="Arial"/>
               </a:rPr>
               <a:t> | Urban, </a:t>
             </a:r>
             <a:r>
-              <a:rPr lang="de-DE" dirty="0" err="1" smtClean="0">
+              <a:rPr lang="de-DE" dirty="0" err="1">
                 <a:latin typeface="Arial"/>
                 <a:cs typeface="Arial"/>
               </a:rPr>
               <a:t>Seeser</a:t>
             </a:r>
             <a:r>
-              <a:rPr lang="de-DE" dirty="0" smtClean="0">
+              <a:rPr lang="de-DE" dirty="0">
                 <a:latin typeface="Arial"/>
                 <a:cs typeface="Arial"/>
               </a:rPr>
               <a:t>, </a:t>
             </a:r>
             <a:r>
-              <a:rPr lang="de-DE" dirty="0" err="1" smtClean="0">
+              <a:rPr lang="de-DE" dirty="0" err="1">
                 <a:latin typeface="Arial"/>
                 <a:cs typeface="Arial"/>
               </a:rPr>
               <a:t>Rienau</a:t>
             </a:r>
             <a:r>
-              <a:rPr lang="de-DE" dirty="0" smtClean="0">
+              <a:rPr lang="de-DE" dirty="0">
                 <a:latin typeface="Arial"/>
                 <a:cs typeface="Arial"/>
               </a:rPr>
               <a:t>, Mitterer, </a:t>
             </a:r>
             <a:r>
-              <a:rPr lang="de-DE" dirty="0" err="1" smtClean="0">
+              <a:rPr lang="de-DE" dirty="0" err="1">
                 <a:latin typeface="Arial"/>
                 <a:cs typeface="Arial"/>
               </a:rPr>
               <a:t>Ehler</a:t>
             </a:r>
             <a:r>
-              <a:rPr lang="de-DE" dirty="0" smtClean="0">
+              <a:rPr lang="de-DE" dirty="0">
                 <a:latin typeface="Arial"/>
                 <a:cs typeface="Arial"/>
               </a:rPr>
               <a:t> | Garching, 08/30/17</a:t>
             </a:r>
-            <a:endParaRPr lang="de-DE" dirty="0">
-              <a:latin typeface="Arial"/>
-              <a:cs typeface="Arial"/>
-            </a:endParaRPr>
           </a:p>
         </p:txBody>
       </p:sp>
@@ -10103,21 +9875,6 @@
   <p:clrMapOvr>
     <a:masterClrMapping/>
   </p:clrMapOvr>
-  <mc:AlternateContent xmlns:mc="http://schemas.openxmlformats.org/markup-compatibility/2006">
-    <mc:Choice xmlns:p14="http://schemas.microsoft.com/office/powerpoint/2010/main" Requires="p14">
-      <p:transition spd="slow" p14:dur="2000"/>
-    </mc:Choice>
-    <mc:Fallback>
-      <p:transition xmlns:p14="http://schemas.microsoft.com/office/powerpoint/2010/main" spd="slow"/>
-    </mc:Fallback>
-  </mc:AlternateContent>
-  <p:timing>
-    <p:tnLst>
-      <p:par>
-        <p:cTn xmlns:p14="http://schemas.microsoft.com/office/powerpoint/2010/main" id="1" dur="indefinite" restart="never" nodeType="tmRoot"/>
-      </p:par>
-    </p:tnLst>
-  </p:timing>
 </p:sld>
 </file>
 
@@ -10154,10 +9911,9 @@
           <a:lstStyle/>
           <a:p>
             <a:r>
-              <a:rPr lang="en-US" dirty="0" smtClean="0"/>
+              <a:rPr lang="en-US" dirty="0"/>
               <a:t>8. Demo – Live</a:t>
             </a:r>
-            <a:endParaRPr lang="en-US" dirty="0"/>
           </a:p>
         </p:txBody>
       </p:sp>
@@ -10182,72 +9938,68 @@
           <a:lstStyle/>
           <a:p>
             <a:r>
-              <a:rPr lang="de-DE" dirty="0" smtClean="0">
+              <a:rPr lang="de-DE" dirty="0">
                 <a:latin typeface="Arial"/>
                 <a:cs typeface="Arial"/>
               </a:rPr>
               <a:t>XML Technology | </a:t>
             </a:r>
             <a:r>
-              <a:rPr lang="de-DE" dirty="0" err="1" smtClean="0">
+              <a:rPr lang="de-DE" dirty="0" err="1">
                 <a:latin typeface="Arial"/>
                 <a:cs typeface="Arial"/>
               </a:rPr>
               <a:t>BlackJack</a:t>
             </a:r>
             <a:r>
-              <a:rPr lang="de-DE" dirty="0" smtClean="0">
+              <a:rPr lang="de-DE" dirty="0">
                 <a:latin typeface="Arial"/>
                 <a:cs typeface="Arial"/>
               </a:rPr>
               <a:t> | Urban, </a:t>
             </a:r>
             <a:r>
-              <a:rPr lang="de-DE" dirty="0" err="1" smtClean="0">
+              <a:rPr lang="de-DE" dirty="0" err="1">
                 <a:latin typeface="Arial"/>
                 <a:cs typeface="Arial"/>
               </a:rPr>
               <a:t>Seeser</a:t>
             </a:r>
             <a:r>
-              <a:rPr lang="de-DE" dirty="0" smtClean="0">
+              <a:rPr lang="de-DE" dirty="0">
                 <a:latin typeface="Arial"/>
                 <a:cs typeface="Arial"/>
               </a:rPr>
               <a:t>, </a:t>
             </a:r>
             <a:r>
-              <a:rPr lang="de-DE" dirty="0" err="1" smtClean="0">
+              <a:rPr lang="de-DE" dirty="0" err="1">
                 <a:latin typeface="Arial"/>
                 <a:cs typeface="Arial"/>
               </a:rPr>
               <a:t>Rienau</a:t>
             </a:r>
             <a:r>
-              <a:rPr lang="de-DE" dirty="0" smtClean="0">
+              <a:rPr lang="de-DE" dirty="0">
                 <a:latin typeface="Arial"/>
                 <a:cs typeface="Arial"/>
               </a:rPr>
               <a:t>, Mitterer, </a:t>
             </a:r>
             <a:r>
-              <a:rPr lang="de-DE" dirty="0" err="1" smtClean="0">
+              <a:rPr lang="de-DE" dirty="0" err="1">
                 <a:latin typeface="Arial"/>
                 <a:cs typeface="Arial"/>
               </a:rPr>
               <a:t>Ehler</a:t>
             </a:r>
             <a:r>
-              <a:rPr lang="de-DE" dirty="0" smtClean="0">
+              <a:rPr lang="de-DE" dirty="0">
                 <a:latin typeface="Arial"/>
                 <a:cs typeface="Arial"/>
               </a:rPr>
               <a:t> | Garching, 08/30/17</a:t>
             </a:r>
-            <a:endParaRPr lang="de-DE" dirty="0">
-              <a:latin typeface="Arial"/>
-              <a:cs typeface="Arial"/>
-            </a:endParaRPr>
           </a:p>
         </p:txBody>
       </p:sp>
@@ -10312,7 +10064,7 @@
               </a:lnSpc>
             </a:pPr>
             <a:r>
-              <a:rPr lang="en-US" sz="3400" b="1" dirty="0" smtClean="0">
+              <a:rPr lang="en-US" sz="3400" b="1" dirty="0">
                 <a:solidFill>
                   <a:srgbClr val="FF0000"/>
                 </a:solidFill>
@@ -10320,12 +10072,6 @@
               </a:rPr>
               <a:t>Live-Demo</a:t>
             </a:r>
-            <a:endParaRPr lang="en-US" sz="3400" b="1" dirty="0" smtClean="0">
-              <a:solidFill>
-                <a:srgbClr val="FF0000"/>
-              </a:solidFill>
-              <a:latin typeface="+mn-lt"/>
-            </a:endParaRPr>
           </a:p>
         </p:txBody>
       </p:sp>
@@ -10339,13 +10085,6 @@
   <p:clrMapOvr>
     <a:masterClrMapping/>
   </p:clrMapOvr>
-  <p:timing>
-    <p:tnLst>
-      <p:par>
-        <p:cTn xmlns:p14="http://schemas.microsoft.com/office/powerpoint/2010/main" id="1" dur="indefinite" restart="never" nodeType="tmRoot"/>
-      </p:par>
-    </p:tnLst>
-  </p:timing>
 </p:sld>
 </file>
 
@@ -10392,10 +10131,9 @@
               <a:t>14</a:t>
             </a:fld>
             <a:r>
-              <a:rPr lang="de-DE" noProof="0" dirty="0" smtClean="0"/>
+              <a:rPr lang="de-DE" noProof="0" dirty="0"/>
               <a:t>/15</a:t>
             </a:r>
-            <a:endParaRPr lang="de-DE" noProof="0" dirty="0"/>
           </a:p>
         </p:txBody>
       </p:sp>
@@ -10420,72 +10158,68 @@
           <a:lstStyle/>
           <a:p>
             <a:r>
-              <a:rPr lang="de-DE" dirty="0" smtClean="0">
+              <a:rPr lang="de-DE" dirty="0">
                 <a:latin typeface="Arial"/>
                 <a:cs typeface="Arial"/>
               </a:rPr>
               <a:t>XML Technology | </a:t>
             </a:r>
             <a:r>
-              <a:rPr lang="de-DE" dirty="0" err="1" smtClean="0">
+              <a:rPr lang="de-DE" dirty="0" err="1">
                 <a:latin typeface="Arial"/>
                 <a:cs typeface="Arial"/>
               </a:rPr>
               <a:t>BlackJack</a:t>
             </a:r>
             <a:r>
-              <a:rPr lang="de-DE" dirty="0" smtClean="0">
+              <a:rPr lang="de-DE" dirty="0">
                 <a:latin typeface="Arial"/>
                 <a:cs typeface="Arial"/>
               </a:rPr>
               <a:t> | Urban, </a:t>
             </a:r>
             <a:r>
-              <a:rPr lang="de-DE" dirty="0" err="1" smtClean="0">
+              <a:rPr lang="de-DE" dirty="0" err="1">
                 <a:latin typeface="Arial"/>
                 <a:cs typeface="Arial"/>
               </a:rPr>
               <a:t>Seeser</a:t>
             </a:r>
             <a:r>
-              <a:rPr lang="de-DE" dirty="0" smtClean="0">
+              <a:rPr lang="de-DE" dirty="0">
                 <a:latin typeface="Arial"/>
                 <a:cs typeface="Arial"/>
               </a:rPr>
               <a:t>, </a:t>
             </a:r>
             <a:r>
-              <a:rPr lang="de-DE" dirty="0" err="1" smtClean="0">
+              <a:rPr lang="de-DE" dirty="0" err="1">
                 <a:latin typeface="Arial"/>
                 <a:cs typeface="Arial"/>
               </a:rPr>
               <a:t>Rienau</a:t>
             </a:r>
             <a:r>
-              <a:rPr lang="de-DE" dirty="0" smtClean="0">
+              <a:rPr lang="de-DE" dirty="0">
                 <a:latin typeface="Arial"/>
                 <a:cs typeface="Arial"/>
               </a:rPr>
               <a:t>, Mitterer, </a:t>
             </a:r>
             <a:r>
-              <a:rPr lang="de-DE" dirty="0" err="1" smtClean="0">
+              <a:rPr lang="de-DE" dirty="0" err="1">
                 <a:latin typeface="Arial"/>
                 <a:cs typeface="Arial"/>
               </a:rPr>
               <a:t>Ehler</a:t>
             </a:r>
             <a:r>
-              <a:rPr lang="de-DE" dirty="0" smtClean="0">
+              <a:rPr lang="de-DE" dirty="0">
                 <a:latin typeface="Arial"/>
                 <a:cs typeface="Arial"/>
               </a:rPr>
               <a:t> | Garching, 08/30/17</a:t>
             </a:r>
-            <a:endParaRPr lang="de-DE" dirty="0">
-              <a:latin typeface="Arial"/>
-              <a:cs typeface="Arial"/>
-            </a:endParaRPr>
           </a:p>
         </p:txBody>
       </p:sp>
@@ -10545,10 +10279,9 @@
               <a:t>much</a:t>
             </a:r>
             <a:r>
-              <a:rPr lang="de-DE" sz="3400" b="1" dirty="0" smtClean="0"/>
+              <a:rPr lang="de-DE" sz="3400" b="1" dirty="0"/>
               <a:t>!</a:t>
             </a:r>
-            <a:endParaRPr lang="de-DE" sz="3400" b="1" dirty="0"/>
           </a:p>
         </p:txBody>
       </p:sp>
@@ -10562,13 +10295,6 @@
   <p:clrMapOvr>
     <a:masterClrMapping/>
   </p:clrMapOvr>
-  <p:timing>
-    <p:tnLst>
-      <p:par>
-        <p:cTn xmlns:p14="http://schemas.microsoft.com/office/powerpoint/2010/main" id="1" dur="indefinite" restart="never" nodeType="tmRoot"/>
-      </p:par>
-    </p:tnLst>
-  </p:timing>
 </p:sld>
 </file>
 
@@ -10678,20 +10404,19 @@
               <a:t>	    Michael Mitterer, Manuel </a:t>
             </a:r>
             <a:r>
-              <a:rPr lang="de-DE" dirty="0" err="1" smtClean="0"/>
+              <a:rPr lang="de-DE" dirty="0" err="1"/>
               <a:t>Ehler</a:t>
             </a:r>
-            <a:endParaRPr lang="de-DE" dirty="0" smtClean="0"/>
-          </a:p>
-          <a:p>
             <a:endParaRPr lang="de-DE" dirty="0"/>
           </a:p>
           <a:p>
-            <a:r>
-              <a:rPr lang="de-DE" dirty="0" smtClean="0"/>
+            <a:endParaRPr lang="de-DE" dirty="0"/>
+          </a:p>
+          <a:p>
+            <a:r>
+              <a:rPr lang="de-DE" dirty="0"/>
               <a:t>Garching, 08/30/2017</a:t>
             </a:r>
-            <a:endParaRPr lang="de-DE" dirty="0"/>
           </a:p>
         </p:txBody>
       </p:sp>
@@ -10700,13 +10425,6 @@
   <p:clrMapOvr>
     <a:masterClrMapping/>
   </p:clrMapOvr>
-  <p:timing>
-    <p:tnLst>
-      <p:par>
-        <p:cTn xmlns:p14="http://schemas.microsoft.com/office/powerpoint/2010/main" id="1" dur="indefinite" restart="never" nodeType="tmRoot"/>
-      </p:par>
-    </p:tnLst>
-  </p:timing>
 </p:sld>
 </file>
 
@@ -10743,14 +10461,9 @@
           <a:lstStyle/>
           <a:p>
             <a:r>
-              <a:rPr lang="en-US" dirty="0" smtClean="0"/>
-              <a:t>To </a:t>
-            </a:r>
-            <a:r>
-              <a:rPr lang="en-US" dirty="0" smtClean="0"/>
-              <a:t>8. Demo</a:t>
-            </a:r>
-            <a:endParaRPr lang="en-US" dirty="0"/>
+              <a:rPr lang="en-US" dirty="0"/>
+              <a:t>To 8. Demo</a:t>
+            </a:r>
           </a:p>
         </p:txBody>
       </p:sp>
@@ -10775,72 +10488,68 @@
           <a:lstStyle/>
           <a:p>
             <a:r>
-              <a:rPr lang="de-DE" dirty="0" smtClean="0">
+              <a:rPr lang="de-DE" dirty="0">
                 <a:latin typeface="Arial"/>
                 <a:cs typeface="Arial"/>
               </a:rPr>
               <a:t>XML Technology | </a:t>
             </a:r>
             <a:r>
-              <a:rPr lang="de-DE" dirty="0" err="1" smtClean="0">
+              <a:rPr lang="de-DE" dirty="0" err="1">
                 <a:latin typeface="Arial"/>
                 <a:cs typeface="Arial"/>
               </a:rPr>
               <a:t>BlackJack</a:t>
             </a:r>
             <a:r>
-              <a:rPr lang="de-DE" dirty="0" smtClean="0">
+              <a:rPr lang="de-DE" dirty="0">
                 <a:latin typeface="Arial"/>
                 <a:cs typeface="Arial"/>
               </a:rPr>
               <a:t> | Urban, </a:t>
             </a:r>
             <a:r>
-              <a:rPr lang="de-DE" dirty="0" err="1" smtClean="0">
+              <a:rPr lang="de-DE" dirty="0" err="1">
                 <a:latin typeface="Arial"/>
                 <a:cs typeface="Arial"/>
               </a:rPr>
               <a:t>Seeser</a:t>
             </a:r>
             <a:r>
-              <a:rPr lang="de-DE" dirty="0" smtClean="0">
+              <a:rPr lang="de-DE" dirty="0">
                 <a:latin typeface="Arial"/>
                 <a:cs typeface="Arial"/>
               </a:rPr>
               <a:t>, </a:t>
             </a:r>
             <a:r>
-              <a:rPr lang="de-DE" dirty="0" err="1" smtClean="0">
+              <a:rPr lang="de-DE" dirty="0" err="1">
                 <a:latin typeface="Arial"/>
                 <a:cs typeface="Arial"/>
               </a:rPr>
               <a:t>Rienau</a:t>
             </a:r>
             <a:r>
-              <a:rPr lang="de-DE" dirty="0" smtClean="0">
+              <a:rPr lang="de-DE" dirty="0">
                 <a:latin typeface="Arial"/>
                 <a:cs typeface="Arial"/>
               </a:rPr>
               <a:t>, Mitterer, </a:t>
             </a:r>
             <a:r>
-              <a:rPr lang="de-DE" dirty="0" err="1" smtClean="0">
+              <a:rPr lang="de-DE" dirty="0" err="1">
                 <a:latin typeface="Arial"/>
                 <a:cs typeface="Arial"/>
               </a:rPr>
               <a:t>Ehler</a:t>
             </a:r>
             <a:r>
-              <a:rPr lang="de-DE" dirty="0" smtClean="0">
+              <a:rPr lang="de-DE" dirty="0">
                 <a:latin typeface="Arial"/>
                 <a:cs typeface="Arial"/>
               </a:rPr>
               <a:t> | Garching, 08/30/17</a:t>
             </a:r>
-            <a:endParaRPr lang="de-DE" dirty="0">
-              <a:latin typeface="Arial"/>
-              <a:cs typeface="Arial"/>
-            </a:endParaRPr>
           </a:p>
         </p:txBody>
       </p:sp>
@@ -11153,21 +10862,6 @@
   <p:clrMapOvr>
     <a:masterClrMapping/>
   </p:clrMapOvr>
-  <mc:AlternateContent xmlns:mc="http://schemas.openxmlformats.org/markup-compatibility/2006">
-    <mc:Choice xmlns:p14="http://schemas.microsoft.com/office/powerpoint/2010/main" Requires="p14">
-      <p:transition spd="slow" p14:dur="2000"/>
-    </mc:Choice>
-    <mc:Fallback>
-      <p:transition xmlns:p14="http://schemas.microsoft.com/office/powerpoint/2010/main" spd="slow"/>
-    </mc:Fallback>
-  </mc:AlternateContent>
-  <p:timing>
-    <p:tnLst>
-      <p:par>
-        <p:cTn xmlns:p14="http://schemas.microsoft.com/office/powerpoint/2010/main" id="1" dur="indefinite" restart="never" nodeType="tmRoot"/>
-      </p:par>
-    </p:tnLst>
-  </p:timing>
 </p:sld>
 </file>
 
@@ -11204,10 +10898,9 @@
           <a:lstStyle/>
           <a:p>
             <a:r>
-              <a:rPr lang="en-US" dirty="0" smtClean="0"/>
+              <a:rPr lang="en-US" dirty="0"/>
               <a:t>Agenda</a:t>
             </a:r>
-            <a:endParaRPr lang="en-US" dirty="0"/>
           </a:p>
         </p:txBody>
       </p:sp>
@@ -11232,7 +10925,7 @@
               <a:buFont typeface="+mj-lt"/>
               <a:buAutoNum type="arabicPeriod"/>
             </a:pPr>
-            <a:endParaRPr lang="en-US" sz="1800" dirty="0" smtClean="0"/>
+            <a:endParaRPr lang="en-US" sz="1800" dirty="0"/>
           </a:p>
           <a:p>
             <a:pPr marL="342900" indent="-342900">
@@ -11240,10 +10933,9 @@
               <a:buAutoNum type="arabicPeriod"/>
             </a:pPr>
             <a:r>
-              <a:rPr lang="en-US" sz="1800" dirty="0" smtClean="0"/>
+              <a:rPr lang="en-US" sz="1800" dirty="0"/>
               <a:t>Introduction</a:t>
             </a:r>
-            <a:endParaRPr lang="en-US" sz="1800" dirty="0" smtClean="0"/>
           </a:p>
           <a:p>
             <a:pPr marL="342900" indent="-342900">
@@ -11251,7 +10943,7 @@
               <a:buAutoNum type="arabicPeriod"/>
             </a:pPr>
             <a:r>
-              <a:rPr lang="en-US" sz="1800" dirty="0" smtClean="0"/>
+              <a:rPr lang="en-US" sz="1800" dirty="0"/>
               <a:t>Technologies</a:t>
             </a:r>
           </a:p>
@@ -11261,10 +10953,9 @@
               <a:buAutoNum type="arabicPeriod"/>
             </a:pPr>
             <a:r>
-              <a:rPr lang="en-US" sz="1800" dirty="0" smtClean="0"/>
+              <a:rPr lang="en-US" sz="1800" dirty="0"/>
               <a:t>Design and Implementation</a:t>
             </a:r>
-            <a:endParaRPr lang="en-US" sz="1800" dirty="0" smtClean="0"/>
           </a:p>
           <a:p>
             <a:pPr marL="342900" indent="-342900">
@@ -11272,7 +10963,7 @@
               <a:buAutoNum type="arabicPeriod"/>
             </a:pPr>
             <a:r>
-              <a:rPr lang="en-US" sz="1800" dirty="0" smtClean="0"/>
+              <a:rPr lang="en-US" sz="1800" dirty="0"/>
               <a:t>Architecture</a:t>
             </a:r>
           </a:p>
@@ -11282,10 +10973,9 @@
               <a:buAutoNum type="arabicPeriod"/>
             </a:pPr>
             <a:r>
-              <a:rPr lang="en-US" sz="1800" dirty="0" smtClean="0"/>
+              <a:rPr lang="en-US" sz="1800" dirty="0"/>
               <a:t>Testing</a:t>
             </a:r>
-            <a:endParaRPr lang="en-US" sz="1800" dirty="0" smtClean="0"/>
           </a:p>
           <a:p>
             <a:pPr marL="342900" indent="-342900">
@@ -11293,7 +10983,7 @@
               <a:buAutoNum type="arabicPeriod"/>
             </a:pPr>
             <a:r>
-              <a:rPr lang="en-US" sz="1800" dirty="0" smtClean="0"/>
+              <a:rPr lang="en-US" sz="1800" dirty="0"/>
               <a:t>Development</a:t>
             </a:r>
           </a:p>
@@ -11303,7 +10993,7 @@
               <a:buAutoNum type="arabicPeriod"/>
             </a:pPr>
             <a:r>
-              <a:rPr lang="en-US" sz="1800" dirty="0" smtClean="0"/>
+              <a:rPr lang="en-US" sz="1800" dirty="0"/>
               <a:t>Conclusion</a:t>
             </a:r>
           </a:p>
@@ -11313,10 +11003,9 @@
               <a:buAutoNum type="arabicPeriod"/>
             </a:pPr>
             <a:r>
-              <a:rPr lang="en-US" sz="1800" dirty="0" smtClean="0"/>
+              <a:rPr lang="en-US" sz="1800" dirty="0"/>
               <a:t>Demo</a:t>
             </a:r>
-            <a:endParaRPr lang="en-US" sz="1800" dirty="0"/>
           </a:p>
         </p:txBody>
       </p:sp>
@@ -11341,72 +11030,68 @@
           <a:lstStyle/>
           <a:p>
             <a:r>
-              <a:rPr lang="de-DE" dirty="0" smtClean="0">
+              <a:rPr lang="de-DE" dirty="0">
                 <a:latin typeface="Arial"/>
                 <a:cs typeface="Arial"/>
               </a:rPr>
               <a:t>XML Technology | </a:t>
             </a:r>
             <a:r>
-              <a:rPr lang="de-DE" dirty="0" err="1" smtClean="0">
+              <a:rPr lang="de-DE" dirty="0" err="1">
                 <a:latin typeface="Arial"/>
                 <a:cs typeface="Arial"/>
               </a:rPr>
               <a:t>BlackJack</a:t>
             </a:r>
             <a:r>
-              <a:rPr lang="de-DE" dirty="0" smtClean="0">
+              <a:rPr lang="de-DE" dirty="0">
                 <a:latin typeface="Arial"/>
                 <a:cs typeface="Arial"/>
               </a:rPr>
               <a:t> | Urban, </a:t>
             </a:r>
             <a:r>
-              <a:rPr lang="de-DE" dirty="0" err="1" smtClean="0">
+              <a:rPr lang="de-DE" dirty="0" err="1">
                 <a:latin typeface="Arial"/>
                 <a:cs typeface="Arial"/>
               </a:rPr>
               <a:t>Seeser</a:t>
             </a:r>
             <a:r>
-              <a:rPr lang="de-DE" dirty="0" smtClean="0">
+              <a:rPr lang="de-DE" dirty="0">
                 <a:latin typeface="Arial"/>
                 <a:cs typeface="Arial"/>
               </a:rPr>
               <a:t>, </a:t>
             </a:r>
             <a:r>
-              <a:rPr lang="de-DE" dirty="0" err="1" smtClean="0">
+              <a:rPr lang="de-DE" dirty="0" err="1">
                 <a:latin typeface="Arial"/>
                 <a:cs typeface="Arial"/>
               </a:rPr>
               <a:t>Rienau</a:t>
             </a:r>
             <a:r>
-              <a:rPr lang="de-DE" dirty="0" smtClean="0">
+              <a:rPr lang="de-DE" dirty="0">
                 <a:latin typeface="Arial"/>
                 <a:cs typeface="Arial"/>
               </a:rPr>
               <a:t>, Mitterer, </a:t>
             </a:r>
             <a:r>
-              <a:rPr lang="de-DE" dirty="0" err="1" smtClean="0">
+              <a:rPr lang="de-DE" dirty="0" err="1">
                 <a:latin typeface="Arial"/>
                 <a:cs typeface="Arial"/>
               </a:rPr>
               <a:t>Ehler</a:t>
             </a:r>
             <a:r>
-              <a:rPr lang="de-DE" dirty="0" smtClean="0">
+              <a:rPr lang="de-DE" dirty="0">
                 <a:latin typeface="Arial"/>
                 <a:cs typeface="Arial"/>
               </a:rPr>
               <a:t> | Garching, 08/30/17</a:t>
             </a:r>
-            <a:endParaRPr lang="de-DE" dirty="0">
-              <a:latin typeface="Arial"/>
-              <a:cs typeface="Arial"/>
-            </a:endParaRPr>
           </a:p>
         </p:txBody>
       </p:sp>
@@ -11453,13 +11138,6 @@
   <p:clrMapOvr>
     <a:masterClrMapping/>
   </p:clrMapOvr>
-  <p:timing>
-    <p:tnLst>
-      <p:par>
-        <p:cTn xmlns:p14="http://schemas.microsoft.com/office/powerpoint/2010/main" id="1" dur="indefinite" restart="never" nodeType="tmRoot"/>
-      </p:par>
-    </p:tnLst>
-  </p:timing>
 </p:sld>
 </file>
 
@@ -11496,10 +11174,9 @@
           <a:lstStyle/>
           <a:p>
             <a:r>
-              <a:rPr lang="en-US" dirty="0" smtClean="0"/>
+              <a:rPr lang="en-US" dirty="0"/>
               <a:t>1. Introduction</a:t>
             </a:r>
-            <a:endParaRPr lang="en-US" dirty="0"/>
           </a:p>
         </p:txBody>
       </p:sp>
@@ -11519,13 +11196,6 @@
             <a:normAutofit/>
           </a:bodyPr>
           <a:lstStyle/>
-          <a:p>
-            <a:pPr marL="285750" indent="-285750">
-              <a:buFont typeface="Arial"/>
-              <a:buChar char="•"/>
-            </a:pPr>
-            <a:endParaRPr lang="en-US" sz="1800" dirty="0" smtClean="0"/>
-          </a:p>
           <a:p>
             <a:pPr marL="285750" indent="-285750">
               <a:buFont typeface="Arial"/>
@@ -11538,10 +11208,7 @@
               <a:buFont typeface="Arial"/>
               <a:buChar char="•"/>
             </a:pPr>
-            <a:r>
-              <a:rPr lang="en-US" sz="1800" dirty="0" smtClean="0"/>
-              <a:t>Team</a:t>
-            </a:r>
+            <a:endParaRPr lang="en-US" sz="1800" dirty="0"/>
           </a:p>
           <a:p>
             <a:pPr marL="285750" indent="-285750">
@@ -11549,8 +11216,8 @@
               <a:buChar char="•"/>
             </a:pPr>
             <a:r>
-              <a:rPr lang="en-US" sz="1800" dirty="0" smtClean="0"/>
-              <a:t>Requirements</a:t>
+              <a:rPr lang="en-US" sz="1800" dirty="0"/>
+              <a:t>Team</a:t>
             </a:r>
           </a:p>
           <a:p>
@@ -11559,10 +11226,19 @@
               <a:buChar char="•"/>
             </a:pPr>
             <a:r>
-              <a:rPr lang="en-US" sz="1800" dirty="0" smtClean="0"/>
+              <a:rPr lang="en-US" sz="1800" dirty="0"/>
+              <a:t>Requirements</a:t>
+            </a:r>
+          </a:p>
+          <a:p>
+            <a:pPr marL="285750" indent="-285750">
+              <a:buFont typeface="Arial"/>
+              <a:buChar char="•"/>
+            </a:pPr>
+            <a:r>
+              <a:rPr lang="en-US" sz="1800" dirty="0"/>
               <a:t>Project’s context</a:t>
             </a:r>
-            <a:endParaRPr lang="en-US" sz="1800" dirty="0"/>
           </a:p>
         </p:txBody>
       </p:sp>
@@ -11587,72 +11263,68 @@
           <a:lstStyle/>
           <a:p>
             <a:r>
-              <a:rPr lang="de-DE" dirty="0" smtClean="0">
+              <a:rPr lang="de-DE" dirty="0">
                 <a:latin typeface="Arial"/>
                 <a:cs typeface="Arial"/>
               </a:rPr>
               <a:t>XML Technology | </a:t>
             </a:r>
             <a:r>
-              <a:rPr lang="de-DE" dirty="0" err="1" smtClean="0">
+              <a:rPr lang="de-DE" dirty="0" err="1">
                 <a:latin typeface="Arial"/>
                 <a:cs typeface="Arial"/>
               </a:rPr>
               <a:t>BlackJack</a:t>
             </a:r>
             <a:r>
-              <a:rPr lang="de-DE" dirty="0" smtClean="0">
+              <a:rPr lang="de-DE" dirty="0">
                 <a:latin typeface="Arial"/>
                 <a:cs typeface="Arial"/>
               </a:rPr>
               <a:t> | Urban, </a:t>
             </a:r>
             <a:r>
-              <a:rPr lang="de-DE" dirty="0" err="1" smtClean="0">
+              <a:rPr lang="de-DE" dirty="0" err="1">
                 <a:latin typeface="Arial"/>
                 <a:cs typeface="Arial"/>
               </a:rPr>
               <a:t>Seeser</a:t>
             </a:r>
             <a:r>
-              <a:rPr lang="de-DE" dirty="0" smtClean="0">
+              <a:rPr lang="de-DE" dirty="0">
                 <a:latin typeface="Arial"/>
                 <a:cs typeface="Arial"/>
               </a:rPr>
               <a:t>, </a:t>
             </a:r>
             <a:r>
-              <a:rPr lang="de-DE" dirty="0" err="1" smtClean="0">
+              <a:rPr lang="de-DE" dirty="0" err="1">
                 <a:latin typeface="Arial"/>
                 <a:cs typeface="Arial"/>
               </a:rPr>
               <a:t>Rienau</a:t>
             </a:r>
             <a:r>
-              <a:rPr lang="de-DE" dirty="0" smtClean="0">
+              <a:rPr lang="de-DE" dirty="0">
                 <a:latin typeface="Arial"/>
                 <a:cs typeface="Arial"/>
               </a:rPr>
               <a:t>, Mitterer, </a:t>
             </a:r>
             <a:r>
-              <a:rPr lang="de-DE" dirty="0" err="1" smtClean="0">
+              <a:rPr lang="de-DE" dirty="0" err="1">
                 <a:latin typeface="Arial"/>
                 <a:cs typeface="Arial"/>
               </a:rPr>
               <a:t>Ehler</a:t>
             </a:r>
             <a:r>
-              <a:rPr lang="de-DE" dirty="0" smtClean="0">
+              <a:rPr lang="de-DE" dirty="0">
                 <a:latin typeface="Arial"/>
                 <a:cs typeface="Arial"/>
               </a:rPr>
               <a:t> | Garching, 08/30/17</a:t>
             </a:r>
-            <a:endParaRPr lang="de-DE" dirty="0">
-              <a:latin typeface="Arial"/>
-              <a:cs typeface="Arial"/>
-            </a:endParaRPr>
           </a:p>
         </p:txBody>
       </p:sp>
@@ -11699,13 +11371,6 @@
   <p:clrMapOvr>
     <a:masterClrMapping/>
   </p:clrMapOvr>
-  <p:timing>
-    <p:tnLst>
-      <p:par>
-        <p:cTn xmlns:p14="http://schemas.microsoft.com/office/powerpoint/2010/main" id="1" dur="indefinite" restart="never" nodeType="tmRoot"/>
-      </p:par>
-    </p:tnLst>
-  </p:timing>
 </p:sld>
 </file>
 
@@ -11742,10 +11407,9 @@
           <a:lstStyle/>
           <a:p>
             <a:r>
-              <a:rPr lang="en-US" dirty="0" smtClean="0"/>
+              <a:rPr lang="en-US" dirty="0"/>
               <a:t>2. Technologies</a:t>
             </a:r>
-            <a:endParaRPr lang="en-US" dirty="0"/>
           </a:p>
         </p:txBody>
       </p:sp>
@@ -11765,13 +11429,6 @@
             <a:normAutofit/>
           </a:bodyPr>
           <a:lstStyle/>
-          <a:p>
-            <a:pPr marL="285750" indent="-285750">
-              <a:buFont typeface="Arial"/>
-              <a:buChar char="•"/>
-            </a:pPr>
-            <a:endParaRPr lang="en-US" sz="1800" dirty="0" smtClean="0"/>
-          </a:p>
           <a:p>
             <a:pPr marL="285750" indent="-285750">
               <a:buFont typeface="Arial"/>
@@ -11784,11 +11441,7 @@
               <a:buFont typeface="Arial"/>
               <a:buChar char="•"/>
             </a:pPr>
-            <a:r>
-              <a:rPr lang="en-US" sz="1800" dirty="0" err="1" smtClean="0"/>
-              <a:t>DocBook</a:t>
-            </a:r>
-            <a:endParaRPr lang="en-US" sz="1800" dirty="0" smtClean="0"/>
+            <a:endParaRPr lang="en-US" sz="1800" dirty="0"/>
           </a:p>
           <a:p>
             <a:pPr marL="285750" indent="-285750">
@@ -11796,9 +11449,10 @@
               <a:buChar char="•"/>
             </a:pPr>
             <a:r>
-              <a:rPr lang="en-US" sz="1800" dirty="0" smtClean="0"/>
-              <a:t>XML</a:t>
-            </a:r>
+              <a:rPr lang="en-US" sz="1800" dirty="0" err="1"/>
+              <a:t>DocBook</a:t>
+            </a:r>
+            <a:endParaRPr lang="en-US" sz="1800" dirty="0"/>
           </a:p>
           <a:p>
             <a:pPr marL="285750" indent="-285750">
@@ -11806,10 +11460,9 @@
               <a:buChar char="•"/>
             </a:pPr>
             <a:r>
-              <a:rPr lang="en-US" sz="1800" dirty="0" err="1" smtClean="0"/>
-              <a:t>Xquery</a:t>
-            </a:r>
-            <a:endParaRPr lang="en-US" sz="1800" dirty="0" smtClean="0"/>
+              <a:rPr lang="en-US" sz="1800" dirty="0"/>
+              <a:t>XML</a:t>
+            </a:r>
           </a:p>
           <a:p>
             <a:pPr marL="285750" indent="-285750">
@@ -11817,9 +11470,10 @@
               <a:buChar char="•"/>
             </a:pPr>
             <a:r>
-              <a:rPr lang="en-US" sz="1800" dirty="0" smtClean="0"/>
-              <a:t>SVG</a:t>
-            </a:r>
+              <a:rPr lang="en-US" sz="1800" dirty="0" err="1"/>
+              <a:t>Xquery</a:t>
+            </a:r>
+            <a:endParaRPr lang="en-US" sz="1800" dirty="0"/>
           </a:p>
           <a:p>
             <a:pPr marL="285750" indent="-285750">
@@ -11827,8 +11481,8 @@
               <a:buChar char="•"/>
             </a:pPr>
             <a:r>
-              <a:rPr lang="en-US" sz="1800" dirty="0" smtClean="0"/>
-              <a:t>XSLT</a:t>
+              <a:rPr lang="en-US" sz="1800" dirty="0"/>
+              <a:t>SVG</a:t>
             </a:r>
           </a:p>
           <a:p>
@@ -11837,10 +11491,19 @@
               <a:buChar char="•"/>
             </a:pPr>
             <a:r>
-              <a:rPr lang="en-US" sz="1800" dirty="0" smtClean="0"/>
+              <a:rPr lang="en-US" sz="1800" dirty="0"/>
+              <a:t>XSLT</a:t>
+            </a:r>
+          </a:p>
+          <a:p>
+            <a:pPr marL="285750" indent="-285750">
+              <a:buFont typeface="Arial"/>
+              <a:buChar char="•"/>
+            </a:pPr>
+            <a:r>
+              <a:rPr lang="en-US" sz="1800" dirty="0"/>
               <a:t>XHTML</a:t>
             </a:r>
-            <a:endParaRPr lang="en-US" sz="1800" dirty="0" smtClean="0"/>
           </a:p>
           <a:p>
             <a:endParaRPr lang="en-US" sz="1800" dirty="0"/>
@@ -11871,72 +11534,68 @@
           <a:lstStyle/>
           <a:p>
             <a:r>
-              <a:rPr lang="de-DE" dirty="0" smtClean="0">
+              <a:rPr lang="de-DE" dirty="0">
                 <a:latin typeface="Arial"/>
                 <a:cs typeface="Arial"/>
               </a:rPr>
               <a:t>XML Technology | </a:t>
             </a:r>
             <a:r>
-              <a:rPr lang="de-DE" dirty="0" err="1" smtClean="0">
+              <a:rPr lang="de-DE" dirty="0" err="1">
                 <a:latin typeface="Arial"/>
                 <a:cs typeface="Arial"/>
               </a:rPr>
               <a:t>BlackJack</a:t>
             </a:r>
             <a:r>
-              <a:rPr lang="de-DE" dirty="0" smtClean="0">
+              <a:rPr lang="de-DE" dirty="0">
                 <a:latin typeface="Arial"/>
                 <a:cs typeface="Arial"/>
               </a:rPr>
               <a:t> | Urban, </a:t>
             </a:r>
             <a:r>
-              <a:rPr lang="de-DE" dirty="0" err="1" smtClean="0">
+              <a:rPr lang="de-DE" dirty="0" err="1">
                 <a:latin typeface="Arial"/>
                 <a:cs typeface="Arial"/>
               </a:rPr>
               <a:t>Seeser</a:t>
             </a:r>
             <a:r>
-              <a:rPr lang="de-DE" dirty="0" smtClean="0">
+              <a:rPr lang="de-DE" dirty="0">
                 <a:latin typeface="Arial"/>
                 <a:cs typeface="Arial"/>
               </a:rPr>
               <a:t>, </a:t>
             </a:r>
             <a:r>
-              <a:rPr lang="de-DE" dirty="0" err="1" smtClean="0">
+              <a:rPr lang="de-DE" dirty="0" err="1">
                 <a:latin typeface="Arial"/>
                 <a:cs typeface="Arial"/>
               </a:rPr>
               <a:t>Rienau</a:t>
             </a:r>
             <a:r>
-              <a:rPr lang="de-DE" dirty="0" smtClean="0">
+              <a:rPr lang="de-DE" dirty="0">
                 <a:latin typeface="Arial"/>
                 <a:cs typeface="Arial"/>
               </a:rPr>
               <a:t>, Mitterer, </a:t>
             </a:r>
             <a:r>
-              <a:rPr lang="de-DE" dirty="0" err="1" smtClean="0">
+              <a:rPr lang="de-DE" dirty="0" err="1">
                 <a:latin typeface="Arial"/>
                 <a:cs typeface="Arial"/>
               </a:rPr>
               <a:t>Ehler</a:t>
             </a:r>
             <a:r>
-              <a:rPr lang="de-DE" dirty="0" smtClean="0">
+              <a:rPr lang="de-DE" dirty="0">
                 <a:latin typeface="Arial"/>
                 <a:cs typeface="Arial"/>
               </a:rPr>
               <a:t> | Garching, 08/30/17</a:t>
             </a:r>
-            <a:endParaRPr lang="de-DE" dirty="0">
-              <a:latin typeface="Arial"/>
-              <a:cs typeface="Arial"/>
-            </a:endParaRPr>
           </a:p>
         </p:txBody>
       </p:sp>
@@ -11983,13 +11642,6 @@
   <p:clrMapOvr>
     <a:masterClrMapping/>
   </p:clrMapOvr>
-  <p:timing>
-    <p:tnLst>
-      <p:par>
-        <p:cTn xmlns:p14="http://schemas.microsoft.com/office/powerpoint/2010/main" id="1" dur="indefinite" restart="never" nodeType="tmRoot"/>
-      </p:par>
-    </p:tnLst>
-  </p:timing>
 </p:sld>
 </file>
 
@@ -12026,10 +11678,9 @@
           <a:lstStyle/>
           <a:p>
             <a:r>
-              <a:rPr lang="en-US" dirty="0" smtClean="0"/>
+              <a:rPr lang="en-US" dirty="0"/>
               <a:t>3. Design and Implementation</a:t>
             </a:r>
-            <a:endParaRPr lang="en-US" dirty="0"/>
           </a:p>
         </p:txBody>
       </p:sp>
@@ -12059,11 +11710,7 @@
             </a:pPr>
             <a:r>
               <a:rPr lang="en-US" sz="1800" dirty="0"/>
-              <a:t>R</a:t>
-            </a:r>
-            <a:r>
-              <a:rPr lang="en-US" sz="1800" dirty="0" smtClean="0"/>
-              <a:t>ules</a:t>
+              <a:t>Rules</a:t>
             </a:r>
           </a:p>
           <a:p>
@@ -12072,7 +11719,7 @@
               <a:buChar char="o"/>
             </a:pPr>
             <a:r>
-              <a:rPr lang="en-US" sz="1800" dirty="0" smtClean="0"/>
+              <a:rPr lang="en-US" sz="1800" dirty="0"/>
               <a:t>Number of players</a:t>
             </a:r>
           </a:p>
@@ -12082,7 +11729,7 @@
               <a:buChar char="o"/>
             </a:pPr>
             <a:r>
-              <a:rPr lang="en-US" sz="1800" dirty="0" smtClean="0"/>
+              <a:rPr lang="en-US" sz="1800" dirty="0"/>
               <a:t>Card deck</a:t>
             </a:r>
           </a:p>
@@ -12092,7 +11739,7 @@
               <a:buChar char="o"/>
             </a:pPr>
             <a:r>
-              <a:rPr lang="en-US" sz="1800" dirty="0" smtClean="0"/>
+              <a:rPr lang="en-US" sz="1800" dirty="0"/>
               <a:t>Drawing cards</a:t>
             </a:r>
           </a:p>
@@ -12102,7 +11749,7 @@
               <a:buChar char="o"/>
             </a:pPr>
             <a:r>
-              <a:rPr lang="en-US" sz="1800" dirty="0" smtClean="0"/>
+              <a:rPr lang="en-US" sz="1800" dirty="0"/>
               <a:t>Player actions</a:t>
             </a:r>
           </a:p>
@@ -12142,10 +11789,9 @@
               <a:buChar char="-"/>
             </a:pPr>
             <a:r>
-              <a:rPr lang="en-US" sz="1800" dirty="0" smtClean="0"/>
+              <a:rPr lang="en-US" sz="1800" dirty="0"/>
               <a:t>Stand</a:t>
             </a:r>
-            <a:endParaRPr lang="en-US" sz="1800" dirty="0" smtClean="0"/>
           </a:p>
           <a:p>
             <a:pPr marL="461963" lvl="1" indent="-285750">
@@ -12153,7 +11799,7 @@
               <a:buChar char="o"/>
             </a:pPr>
             <a:r>
-              <a:rPr lang="en-US" sz="1800" dirty="0" smtClean="0"/>
+              <a:rPr lang="en-US" sz="1800" dirty="0"/>
               <a:t>Winnings status and winnings</a:t>
             </a:r>
           </a:p>
@@ -12163,7 +11809,7 @@
               <a:buChar char="-"/>
             </a:pPr>
             <a:r>
-              <a:rPr lang="en-US" sz="1800" dirty="0" smtClean="0"/>
+              <a:rPr lang="en-US" sz="1800" dirty="0"/>
               <a:t>Dealer wins against player</a:t>
             </a:r>
           </a:p>
@@ -12173,7 +11819,7 @@
               <a:buChar char="-"/>
             </a:pPr>
             <a:r>
-              <a:rPr lang="en-US" sz="1800" dirty="0" smtClean="0"/>
+              <a:rPr lang="en-US" sz="1800" dirty="0"/>
               <a:t>Player wins against dealer</a:t>
             </a:r>
           </a:p>
@@ -12183,7 +11829,7 @@
               <a:buChar char="-"/>
             </a:pPr>
             <a:r>
-              <a:rPr lang="en-US" sz="1800" dirty="0" smtClean="0"/>
+              <a:rPr lang="en-US" sz="1800" dirty="0"/>
               <a:t>Tie between player and dealer</a:t>
             </a:r>
           </a:p>
@@ -12191,11 +11837,11 @@
             <a:pPr lvl="2" indent="0">
               <a:buNone/>
             </a:pPr>
-            <a:endParaRPr lang="en-US" sz="1800" dirty="0" smtClean="0"/>
-          </a:p>
-          <a:p>
-            <a:r>
-              <a:rPr lang="en-US" sz="1800" dirty="0" smtClean="0">
+            <a:endParaRPr lang="en-US" sz="1800" dirty="0"/>
+          </a:p>
+          <a:p>
+            <a:r>
+              <a:rPr lang="en-US" sz="1800" dirty="0">
                 <a:sym typeface="Wingdings"/>
               </a:rPr>
               <a:t> Realistic casino experience!</a:t>
@@ -12225,72 +11871,68 @@
           <a:lstStyle/>
           <a:p>
             <a:r>
-              <a:rPr lang="de-DE" dirty="0" smtClean="0">
+              <a:rPr lang="de-DE" dirty="0">
                 <a:latin typeface="Arial"/>
                 <a:cs typeface="Arial"/>
               </a:rPr>
               <a:t>XML Technology | </a:t>
             </a:r>
             <a:r>
-              <a:rPr lang="de-DE" dirty="0" err="1" smtClean="0">
+              <a:rPr lang="de-DE" dirty="0" err="1">
                 <a:latin typeface="Arial"/>
                 <a:cs typeface="Arial"/>
               </a:rPr>
               <a:t>BlackJack</a:t>
             </a:r>
             <a:r>
-              <a:rPr lang="de-DE" dirty="0" smtClean="0">
+              <a:rPr lang="de-DE" dirty="0">
                 <a:latin typeface="Arial"/>
                 <a:cs typeface="Arial"/>
               </a:rPr>
               <a:t> | Urban, </a:t>
             </a:r>
             <a:r>
-              <a:rPr lang="de-DE" dirty="0" err="1" smtClean="0">
+              <a:rPr lang="de-DE" dirty="0" err="1">
                 <a:latin typeface="Arial"/>
                 <a:cs typeface="Arial"/>
               </a:rPr>
               <a:t>Seeser</a:t>
             </a:r>
             <a:r>
-              <a:rPr lang="de-DE" dirty="0" smtClean="0">
+              <a:rPr lang="de-DE" dirty="0">
                 <a:latin typeface="Arial"/>
                 <a:cs typeface="Arial"/>
               </a:rPr>
               <a:t>, </a:t>
             </a:r>
             <a:r>
-              <a:rPr lang="de-DE" dirty="0" err="1" smtClean="0">
+              <a:rPr lang="de-DE" dirty="0" err="1">
                 <a:latin typeface="Arial"/>
                 <a:cs typeface="Arial"/>
               </a:rPr>
               <a:t>Rienau</a:t>
             </a:r>
             <a:r>
-              <a:rPr lang="de-DE" dirty="0" smtClean="0">
+              <a:rPr lang="de-DE" dirty="0">
                 <a:latin typeface="Arial"/>
                 <a:cs typeface="Arial"/>
               </a:rPr>
               <a:t>, Mitterer, </a:t>
             </a:r>
             <a:r>
-              <a:rPr lang="de-DE" dirty="0" err="1" smtClean="0">
+              <a:rPr lang="de-DE" dirty="0" err="1">
                 <a:latin typeface="Arial"/>
                 <a:cs typeface="Arial"/>
               </a:rPr>
               <a:t>Ehler</a:t>
             </a:r>
             <a:r>
-              <a:rPr lang="de-DE" dirty="0" smtClean="0">
+              <a:rPr lang="de-DE" dirty="0">
                 <a:latin typeface="Arial"/>
                 <a:cs typeface="Arial"/>
               </a:rPr>
               <a:t> | Garching, 08/30/17</a:t>
             </a:r>
-            <a:endParaRPr lang="de-DE" dirty="0">
-              <a:latin typeface="Arial"/>
-              <a:cs typeface="Arial"/>
-            </a:endParaRPr>
           </a:p>
         </p:txBody>
       </p:sp>
@@ -12337,13 +11979,6 @@
   <p:clrMapOvr>
     <a:masterClrMapping/>
   </p:clrMapOvr>
-  <p:timing>
-    <p:tnLst>
-      <p:par>
-        <p:cTn xmlns:p14="http://schemas.microsoft.com/office/powerpoint/2010/main" id="1" dur="indefinite" restart="never" nodeType="tmRoot"/>
-      </p:par>
-    </p:tnLst>
-  </p:timing>
 </p:sld>
 </file>
 
@@ -12380,18 +12015,9 @@
           <a:lstStyle/>
           <a:p>
             <a:r>
-              <a:rPr lang="en-US" dirty="0" smtClean="0"/>
-              <a:t>4. </a:t>
-            </a:r>
-            <a:r>
               <a:rPr lang="en-US" dirty="0"/>
-              <a:t>Architecture – </a:t>
-            </a:r>
-            <a:r>
-              <a:rPr lang="en-US" dirty="0" smtClean="0"/>
-              <a:t>MVC</a:t>
-            </a:r>
-            <a:endParaRPr lang="en-US" dirty="0"/>
+              <a:t>4. Architecture – MVC</a:t>
+            </a:r>
           </a:p>
         </p:txBody>
       </p:sp>
@@ -12416,72 +12042,68 @@
           <a:lstStyle/>
           <a:p>
             <a:r>
-              <a:rPr lang="de-DE" dirty="0" smtClean="0">
+              <a:rPr lang="de-DE" dirty="0">
                 <a:latin typeface="Arial"/>
                 <a:cs typeface="Arial"/>
               </a:rPr>
               <a:t>XML Technology | </a:t>
             </a:r>
             <a:r>
-              <a:rPr lang="de-DE" dirty="0" err="1" smtClean="0">
+              <a:rPr lang="de-DE" dirty="0" err="1">
                 <a:latin typeface="Arial"/>
                 <a:cs typeface="Arial"/>
               </a:rPr>
               <a:t>BlackJack</a:t>
             </a:r>
             <a:r>
-              <a:rPr lang="de-DE" dirty="0" smtClean="0">
+              <a:rPr lang="de-DE" dirty="0">
                 <a:latin typeface="Arial"/>
                 <a:cs typeface="Arial"/>
               </a:rPr>
               <a:t> | Urban, </a:t>
             </a:r>
             <a:r>
-              <a:rPr lang="de-DE" dirty="0" err="1" smtClean="0">
+              <a:rPr lang="de-DE" dirty="0" err="1">
                 <a:latin typeface="Arial"/>
                 <a:cs typeface="Arial"/>
               </a:rPr>
               <a:t>Seeser</a:t>
             </a:r>
             <a:r>
-              <a:rPr lang="de-DE" dirty="0" smtClean="0">
+              <a:rPr lang="de-DE" dirty="0">
                 <a:latin typeface="Arial"/>
                 <a:cs typeface="Arial"/>
               </a:rPr>
               <a:t>, </a:t>
             </a:r>
             <a:r>
-              <a:rPr lang="de-DE" dirty="0" err="1" smtClean="0">
+              <a:rPr lang="de-DE" dirty="0" err="1">
                 <a:latin typeface="Arial"/>
                 <a:cs typeface="Arial"/>
               </a:rPr>
               <a:t>Rienau</a:t>
             </a:r>
             <a:r>
-              <a:rPr lang="de-DE" dirty="0" smtClean="0">
+              <a:rPr lang="de-DE" dirty="0">
                 <a:latin typeface="Arial"/>
                 <a:cs typeface="Arial"/>
               </a:rPr>
               <a:t>, Mitterer, </a:t>
             </a:r>
             <a:r>
-              <a:rPr lang="de-DE" dirty="0" err="1" smtClean="0">
+              <a:rPr lang="de-DE" dirty="0" err="1">
                 <a:latin typeface="Arial"/>
                 <a:cs typeface="Arial"/>
               </a:rPr>
               <a:t>Ehler</a:t>
             </a:r>
             <a:r>
-              <a:rPr lang="de-DE" dirty="0" smtClean="0">
+              <a:rPr lang="de-DE" dirty="0">
                 <a:latin typeface="Arial"/>
                 <a:cs typeface="Arial"/>
               </a:rPr>
               <a:t> | Garching, 08/30/17</a:t>
             </a:r>
-            <a:endParaRPr lang="de-DE" dirty="0">
-              <a:latin typeface="Arial"/>
-              <a:cs typeface="Arial"/>
-            </a:endParaRPr>
           </a:p>
         </p:txBody>
       </p:sp>
@@ -12576,19 +12198,10 @@
               </a:lnSpc>
             </a:pPr>
             <a:r>
-              <a:rPr lang="en-US" sz="800" dirty="0" smtClean="0">
+              <a:rPr lang="en-US" sz="800" dirty="0">
                 <a:latin typeface="+mn-lt"/>
               </a:rPr>
               <a:t>Source: </a:t>
-            </a:r>
-            <a:r>
-              <a:rPr lang="en-US" sz="800" u="sng" dirty="0" smtClean="0">
-                <a:solidFill>
-                  <a:srgbClr val="0000FF"/>
-                </a:solidFill>
-                <a:latin typeface="+mn-lt"/>
-              </a:rPr>
-              <a:t>https</a:t>
             </a:r>
             <a:r>
               <a:rPr lang="en-US" sz="800" u="sng" dirty="0">
@@ -12597,7 +12210,7 @@
                 </a:solidFill>
                 <a:latin typeface="+mn-lt"/>
               </a:rPr>
-              <a:t>://</a:t>
+              <a:t>https://</a:t>
             </a:r>
             <a:r>
               <a:rPr lang="en-US" sz="800" u="sng" dirty="0" err="1">
@@ -12615,32 +12228,14 @@
                 </a:solidFill>
                 <a:latin typeface="+mn-lt"/>
               </a:rPr>
-              <a:t>/modelviewcontrollermvc-140211001124-phpapp01/ 95/model-view-controller-mvc-6-638.jpg?cb=</a:t>
-            </a:r>
-            <a:r>
-              <a:rPr lang="en-US" sz="800" u="sng" dirty="0" smtClean="0">
-                <a:solidFill>
-                  <a:srgbClr val="0000FF"/>
-                </a:solidFill>
-                <a:latin typeface="+mn-lt"/>
-              </a:rPr>
-              <a:t>1392077579</a:t>
-            </a:r>
-            <a:r>
-              <a:rPr lang="en-US" sz="800" dirty="0" smtClean="0">
-                <a:latin typeface="+mn-lt"/>
-              </a:rPr>
-              <a:t>, accessed </a:t>
+              <a:t>/modelviewcontrollermvc-140211001124-phpapp01/ 95/model-view-controller-mvc-6-638.jpg?cb=1392077579</a:t>
             </a:r>
             <a:r>
               <a:rPr lang="en-US" sz="800" dirty="0">
                 <a:latin typeface="+mn-lt"/>
               </a:rPr>
-              <a:t>on 08/23/17 at around 04:19 PM</a:t>
-            </a:r>
-            <a:endParaRPr lang="en-US" sz="800" dirty="0" smtClean="0">
-              <a:latin typeface="+mn-lt"/>
-            </a:endParaRPr>
+              <a:t>, accessed on 08/23/17 at around 04:19 PM</a:t>
+            </a:r>
           </a:p>
         </p:txBody>
       </p:sp>
@@ -12654,13 +12249,6 @@
   <p:clrMapOvr>
     <a:masterClrMapping/>
   </p:clrMapOvr>
-  <p:timing>
-    <p:tnLst>
-      <p:par>
-        <p:cTn xmlns:p14="http://schemas.microsoft.com/office/powerpoint/2010/main" id="1" dur="indefinite" restart="never" nodeType="tmRoot"/>
-      </p:par>
-    </p:tnLst>
-  </p:timing>
 </p:sld>
 </file>
 
@@ -12697,10 +12285,9 @@
           <a:lstStyle/>
           <a:p>
             <a:r>
-              <a:rPr lang="en-US" dirty="0" smtClean="0"/>
+              <a:rPr lang="en-US" dirty="0"/>
               <a:t>4. Architecture – Class Diagram</a:t>
             </a:r>
-            <a:endParaRPr lang="en-US" dirty="0"/>
           </a:p>
         </p:txBody>
       </p:sp>
@@ -12725,72 +12312,68 @@
           <a:lstStyle/>
           <a:p>
             <a:r>
-              <a:rPr lang="de-DE" dirty="0" smtClean="0">
+              <a:rPr lang="de-DE" dirty="0">
                 <a:latin typeface="Arial"/>
                 <a:cs typeface="Arial"/>
               </a:rPr>
               <a:t>XML Technology | </a:t>
             </a:r>
             <a:r>
-              <a:rPr lang="de-DE" dirty="0" err="1" smtClean="0">
+              <a:rPr lang="de-DE" dirty="0" err="1">
                 <a:latin typeface="Arial"/>
                 <a:cs typeface="Arial"/>
               </a:rPr>
               <a:t>BlackJack</a:t>
             </a:r>
             <a:r>
-              <a:rPr lang="de-DE" dirty="0" smtClean="0">
+              <a:rPr lang="de-DE" dirty="0">
                 <a:latin typeface="Arial"/>
                 <a:cs typeface="Arial"/>
               </a:rPr>
               <a:t> | Urban, </a:t>
             </a:r>
             <a:r>
-              <a:rPr lang="de-DE" dirty="0" err="1" smtClean="0">
+              <a:rPr lang="de-DE" dirty="0" err="1">
                 <a:latin typeface="Arial"/>
                 <a:cs typeface="Arial"/>
               </a:rPr>
               <a:t>Seeser</a:t>
             </a:r>
             <a:r>
-              <a:rPr lang="de-DE" dirty="0" smtClean="0">
+              <a:rPr lang="de-DE" dirty="0">
                 <a:latin typeface="Arial"/>
                 <a:cs typeface="Arial"/>
               </a:rPr>
               <a:t>, </a:t>
             </a:r>
             <a:r>
-              <a:rPr lang="de-DE" dirty="0" err="1" smtClean="0">
+              <a:rPr lang="de-DE" dirty="0" err="1">
                 <a:latin typeface="Arial"/>
                 <a:cs typeface="Arial"/>
               </a:rPr>
               <a:t>Rienau</a:t>
             </a:r>
             <a:r>
-              <a:rPr lang="de-DE" dirty="0" smtClean="0">
+              <a:rPr lang="de-DE" dirty="0">
                 <a:latin typeface="Arial"/>
                 <a:cs typeface="Arial"/>
               </a:rPr>
               <a:t>, Mitterer, </a:t>
             </a:r>
             <a:r>
-              <a:rPr lang="de-DE" dirty="0" err="1" smtClean="0">
+              <a:rPr lang="de-DE" dirty="0" err="1">
                 <a:latin typeface="Arial"/>
                 <a:cs typeface="Arial"/>
               </a:rPr>
               <a:t>Ehler</a:t>
             </a:r>
             <a:r>
-              <a:rPr lang="de-DE" dirty="0" smtClean="0">
+              <a:rPr lang="de-DE" dirty="0">
                 <a:latin typeface="Arial"/>
                 <a:cs typeface="Arial"/>
               </a:rPr>
               <a:t> | Garching, 08/30/17</a:t>
             </a:r>
-            <a:endParaRPr lang="de-DE" dirty="0">
-              <a:latin typeface="Arial"/>
-              <a:cs typeface="Arial"/>
-            </a:endParaRPr>
           </a:p>
         </p:txBody>
       </p:sp>
@@ -12867,13 +12450,6 @@
   <p:clrMapOvr>
     <a:masterClrMapping/>
   </p:clrMapOvr>
-  <p:timing>
-    <p:tnLst>
-      <p:par>
-        <p:cTn xmlns:p14="http://schemas.microsoft.com/office/powerpoint/2010/main" id="1" dur="indefinite" restart="never" nodeType="tmRoot"/>
-      </p:par>
-    </p:tnLst>
-  </p:timing>
 </p:sld>
 </file>
 
@@ -12910,10 +12486,9 @@
           <a:lstStyle/>
           <a:p>
             <a:r>
-              <a:rPr lang="en-US" dirty="0" smtClean="0"/>
+              <a:rPr lang="en-US" dirty="0"/>
               <a:t>5. Testing</a:t>
             </a:r>
-            <a:endParaRPr lang="en-US" dirty="0"/>
           </a:p>
         </p:txBody>
       </p:sp>
@@ -12934,7 +12509,7 @@
           </a:bodyPr>
           <a:lstStyle/>
           <a:p>
-            <a:endParaRPr lang="en-US" sz="1800" dirty="0" smtClean="0"/>
+            <a:endParaRPr lang="en-US" sz="1800" dirty="0"/>
           </a:p>
           <a:p>
             <a:endParaRPr lang="en-US" sz="1800" dirty="0"/>
@@ -12945,7 +12520,7 @@
               <a:buChar char="•"/>
             </a:pPr>
             <a:r>
-              <a:rPr lang="en-US" sz="1800" dirty="0" smtClean="0"/>
+              <a:rPr lang="en-US" sz="1800" dirty="0"/>
               <a:t>Reviews</a:t>
             </a:r>
           </a:p>
@@ -12955,7 +12530,7 @@
               <a:buChar char="•"/>
             </a:pPr>
             <a:r>
-              <a:rPr lang="en-US" sz="1800" dirty="0" smtClean="0"/>
+              <a:rPr lang="en-US" sz="1800" dirty="0"/>
               <a:t>Unit tests</a:t>
             </a:r>
           </a:p>
@@ -12965,7 +12540,7 @@
               <a:buChar char="•"/>
             </a:pPr>
             <a:r>
-              <a:rPr lang="en-US" sz="1800" dirty="0" smtClean="0"/>
+              <a:rPr lang="en-US" sz="1800" dirty="0"/>
               <a:t>Integration tests</a:t>
             </a:r>
           </a:p>
@@ -12975,7 +12550,7 @@
               <a:buChar char="•"/>
             </a:pPr>
             <a:r>
-              <a:rPr lang="en-US" sz="1800" dirty="0" smtClean="0"/>
+              <a:rPr lang="en-US" sz="1800" dirty="0"/>
               <a:t>REST queries with additional functions</a:t>
             </a:r>
           </a:p>
@@ -12985,10 +12560,9 @@
               <a:buChar char="•"/>
             </a:pPr>
             <a:r>
-              <a:rPr lang="en-US" sz="1800" dirty="0" smtClean="0"/>
+              <a:rPr lang="en-US" sz="1800" dirty="0"/>
               <a:t>Borderline cases</a:t>
             </a:r>
-            <a:endParaRPr lang="en-US" sz="1800" dirty="0"/>
           </a:p>
         </p:txBody>
       </p:sp>
@@ -13013,72 +12587,68 @@
           <a:lstStyle/>
           <a:p>
             <a:r>
-              <a:rPr lang="de-DE" dirty="0" smtClean="0">
+              <a:rPr lang="de-DE" dirty="0">
                 <a:latin typeface="Arial"/>
                 <a:cs typeface="Arial"/>
               </a:rPr>
               <a:t>XML Technology | </a:t>
             </a:r>
             <a:r>
-              <a:rPr lang="de-DE" dirty="0" err="1" smtClean="0">
+              <a:rPr lang="de-DE" dirty="0" err="1">
                 <a:latin typeface="Arial"/>
                 <a:cs typeface="Arial"/>
               </a:rPr>
               <a:t>BlackJack</a:t>
             </a:r>
             <a:r>
-              <a:rPr lang="de-DE" dirty="0" smtClean="0">
+              <a:rPr lang="de-DE" dirty="0">
                 <a:latin typeface="Arial"/>
                 <a:cs typeface="Arial"/>
               </a:rPr>
               <a:t> | Urban, </a:t>
             </a:r>
             <a:r>
-              <a:rPr lang="de-DE" dirty="0" err="1" smtClean="0">
+              <a:rPr lang="de-DE" dirty="0" err="1">
                 <a:latin typeface="Arial"/>
                 <a:cs typeface="Arial"/>
               </a:rPr>
               <a:t>Seeser</a:t>
             </a:r>
             <a:r>
-              <a:rPr lang="de-DE" dirty="0" smtClean="0">
+              <a:rPr lang="de-DE" dirty="0">
                 <a:latin typeface="Arial"/>
                 <a:cs typeface="Arial"/>
               </a:rPr>
               <a:t>, </a:t>
             </a:r>
             <a:r>
-              <a:rPr lang="de-DE" dirty="0" err="1" smtClean="0">
+              <a:rPr lang="de-DE" dirty="0" err="1">
                 <a:latin typeface="Arial"/>
                 <a:cs typeface="Arial"/>
               </a:rPr>
               <a:t>Rienau</a:t>
             </a:r>
             <a:r>
-              <a:rPr lang="de-DE" dirty="0" smtClean="0">
+              <a:rPr lang="de-DE" dirty="0">
                 <a:latin typeface="Arial"/>
                 <a:cs typeface="Arial"/>
               </a:rPr>
               <a:t>, Mitterer, </a:t>
             </a:r>
             <a:r>
-              <a:rPr lang="de-DE" dirty="0" err="1" smtClean="0">
+              <a:rPr lang="de-DE" dirty="0" err="1">
                 <a:latin typeface="Arial"/>
                 <a:cs typeface="Arial"/>
               </a:rPr>
               <a:t>Ehler</a:t>
             </a:r>
             <a:r>
-              <a:rPr lang="de-DE" dirty="0" smtClean="0">
+              <a:rPr lang="de-DE" dirty="0">
                 <a:latin typeface="Arial"/>
                 <a:cs typeface="Arial"/>
               </a:rPr>
               <a:t> | Garching, 08/30/17</a:t>
             </a:r>
-            <a:endParaRPr lang="de-DE" dirty="0">
-              <a:latin typeface="Arial"/>
-              <a:cs typeface="Arial"/>
-            </a:endParaRPr>
           </a:p>
         </p:txBody>
       </p:sp>
@@ -13125,13 +12695,6 @@
   <p:clrMapOvr>
     <a:masterClrMapping/>
   </p:clrMapOvr>
-  <p:timing>
-    <p:tnLst>
-      <p:par>
-        <p:cTn xmlns:p14="http://schemas.microsoft.com/office/powerpoint/2010/main" id="1" dur="indefinite" restart="never" nodeType="tmRoot"/>
-      </p:par>
-    </p:tnLst>
-  </p:timing>
 </p:sld>
 </file>
 
@@ -13168,18 +12731,9 @@
           <a:lstStyle/>
           <a:p>
             <a:r>
-              <a:rPr lang="en-US" dirty="0" smtClean="0"/>
-              <a:t>6. </a:t>
-            </a:r>
-            <a:r>
               <a:rPr lang="en-US" dirty="0"/>
-              <a:t>Development </a:t>
-            </a:r>
-            <a:r>
-              <a:rPr lang="en-US" dirty="0" smtClean="0"/>
-              <a:t>– Environment</a:t>
-            </a:r>
-            <a:endParaRPr lang="en-US" dirty="0"/>
+              <a:t>6. Development – Environment</a:t>
+            </a:r>
           </a:p>
         </p:txBody>
       </p:sp>
@@ -13199,15 +12753,6 @@
             <a:normAutofit/>
           </a:bodyPr>
           <a:lstStyle/>
-          <a:p>
-            <a:pPr marL="285750" lvl="1" indent="-285750">
-              <a:buFont typeface="Arial"/>
-              <a:buChar char="•"/>
-            </a:pPr>
-            <a:endParaRPr lang="en-US" sz="1800" dirty="0" smtClean="0">
-              <a:sym typeface="Wingdings"/>
-            </a:endParaRPr>
-          </a:p>
           <a:p>
             <a:pPr marL="285750" lvl="1" indent="-285750">
               <a:buFont typeface="Arial"/>
@@ -13218,35 +12763,11 @@
             </a:endParaRPr>
           </a:p>
           <a:p>
-            <a:pPr marL="285750" lvl="1" indent="-285750">
-              <a:buFont typeface="Arial"/>
-              <a:buChar char="•"/>
-            </a:pPr>
-            <a:r>
-              <a:rPr lang="en-US" sz="1800" dirty="0" smtClean="0">
-                <a:sym typeface="Wingdings"/>
-              </a:rPr>
-              <a:t>Oxygen </a:t>
-            </a:r>
-            <a:r>
-              <a:rPr lang="en-US" sz="1800" dirty="0">
-                <a:sym typeface="Wingdings"/>
-              </a:rPr>
-              <a:t>XML Editor</a:t>
-            </a:r>
-          </a:p>
-          <a:p>
             <a:pPr marL="285750" indent="-285750">
               <a:buFont typeface="Arial"/>
               <a:buChar char="•"/>
             </a:pPr>
-            <a:r>
-              <a:rPr lang="en-US" sz="1800" dirty="0" err="1" smtClean="0">
-                <a:sym typeface="Wingdings"/>
-              </a:rPr>
-              <a:t>GitHub</a:t>
-            </a:r>
-            <a:endParaRPr lang="en-US" sz="1800" dirty="0" smtClean="0">
+            <a:endParaRPr lang="en-US" sz="1800" dirty="0">
               <a:sym typeface="Wingdings"/>
             </a:endParaRPr>
           </a:p>
@@ -13256,7 +12777,22 @@
               <a:buChar char="•"/>
             </a:pPr>
             <a:r>
-              <a:rPr lang="en-US" sz="1800" dirty="0" err="1" smtClean="0">
+              <a:rPr lang="en-US" sz="1800" dirty="0">
+                <a:sym typeface="Wingdings"/>
+              </a:rPr>
+              <a:t>Oxygen XML Editor</a:t>
+            </a:r>
+            <a:endParaRPr lang="en-US" sz="1800" dirty="0">
+              <a:sym typeface="Wingdings"/>
+            </a:endParaRPr>
+          </a:p>
+          <a:p>
+            <a:pPr marL="285750" indent="-285750">
+              <a:buFont typeface="Arial"/>
+              <a:buChar char="•"/>
+            </a:pPr>
+            <a:r>
+              <a:rPr lang="en-US" sz="1800" dirty="0" err="1">
                 <a:sym typeface="Wingdings"/>
               </a:rPr>
               <a:t>BaseX</a:t>
@@ -13264,6 +12800,26 @@
             <a:endParaRPr lang="en-US" sz="1800" dirty="0">
               <a:sym typeface="Wingdings"/>
             </a:endParaRPr>
+          </a:p>
+          <a:p>
+            <a:pPr marL="0" lvl="1" indent="0">
+              <a:buNone/>
+            </a:pPr>
+            <a:endParaRPr lang="en-US" sz="1800" dirty="0">
+              <a:sym typeface="Wingdings"/>
+            </a:endParaRPr>
+          </a:p>
+          <a:p>
+            <a:pPr marL="285750" indent="-285750">
+              <a:buFont typeface="Arial"/>
+              <a:buChar char="•"/>
+            </a:pPr>
+            <a:r>
+              <a:rPr lang="en-US" sz="1800" dirty="0">
+                <a:sym typeface="Wingdings"/>
+              </a:rPr>
+              <a:t>GitHub</a:t>
+            </a:r>
           </a:p>
         </p:txBody>
       </p:sp>
@@ -13288,72 +12844,68 @@
           <a:lstStyle/>
           <a:p>
             <a:r>
-              <a:rPr lang="de-DE" dirty="0" smtClean="0">
+              <a:rPr lang="de-DE" dirty="0">
                 <a:latin typeface="Arial"/>
                 <a:cs typeface="Arial"/>
               </a:rPr>
               <a:t>XML Technology | </a:t>
             </a:r>
             <a:r>
-              <a:rPr lang="de-DE" dirty="0" err="1" smtClean="0">
+              <a:rPr lang="de-DE" dirty="0" err="1">
                 <a:latin typeface="Arial"/>
                 <a:cs typeface="Arial"/>
               </a:rPr>
               <a:t>BlackJack</a:t>
             </a:r>
             <a:r>
-              <a:rPr lang="de-DE" dirty="0" smtClean="0">
+              <a:rPr lang="de-DE" dirty="0">
                 <a:latin typeface="Arial"/>
                 <a:cs typeface="Arial"/>
               </a:rPr>
               <a:t> | Urban, </a:t>
             </a:r>
             <a:r>
-              <a:rPr lang="de-DE" dirty="0" err="1" smtClean="0">
+              <a:rPr lang="de-DE" dirty="0" err="1">
                 <a:latin typeface="Arial"/>
                 <a:cs typeface="Arial"/>
               </a:rPr>
               <a:t>Seeser</a:t>
             </a:r>
             <a:r>
-              <a:rPr lang="de-DE" dirty="0" smtClean="0">
+              <a:rPr lang="de-DE" dirty="0">
                 <a:latin typeface="Arial"/>
                 <a:cs typeface="Arial"/>
               </a:rPr>
               <a:t>, </a:t>
             </a:r>
             <a:r>
-              <a:rPr lang="de-DE" dirty="0" err="1" smtClean="0">
+              <a:rPr lang="de-DE" dirty="0" err="1">
                 <a:latin typeface="Arial"/>
                 <a:cs typeface="Arial"/>
               </a:rPr>
               <a:t>Rienau</a:t>
             </a:r>
             <a:r>
-              <a:rPr lang="de-DE" dirty="0" smtClean="0">
+              <a:rPr lang="de-DE" dirty="0">
                 <a:latin typeface="Arial"/>
                 <a:cs typeface="Arial"/>
               </a:rPr>
               <a:t>, Mitterer, </a:t>
             </a:r>
             <a:r>
-              <a:rPr lang="de-DE" dirty="0" err="1" smtClean="0">
+              <a:rPr lang="de-DE" dirty="0" err="1">
                 <a:latin typeface="Arial"/>
                 <a:cs typeface="Arial"/>
               </a:rPr>
               <a:t>Ehler</a:t>
             </a:r>
             <a:r>
-              <a:rPr lang="de-DE" dirty="0" smtClean="0">
+              <a:rPr lang="de-DE" dirty="0">
                 <a:latin typeface="Arial"/>
                 <a:cs typeface="Arial"/>
               </a:rPr>
               <a:t> | Garching, 08/30/17</a:t>
             </a:r>
-            <a:endParaRPr lang="de-DE" dirty="0">
-              <a:latin typeface="Arial"/>
-              <a:cs typeface="Arial"/>
-            </a:endParaRPr>
           </a:p>
         </p:txBody>
       </p:sp>
@@ -13400,13 +12952,6 @@
   <p:clrMapOvr>
     <a:masterClrMapping/>
   </p:clrMapOvr>
-  <p:timing>
-    <p:tnLst>
-      <p:par>
-        <p:cTn xmlns:p14="http://schemas.microsoft.com/office/powerpoint/2010/main" id="1" dur="indefinite" restart="never" nodeType="tmRoot"/>
-      </p:par>
-    </p:tnLst>
-  </p:timing>
 </p:sld>
 </file>
 

</xml_diff>